<commit_message>
Añado el diagrama de la base de datos de ASP.NET MVC
</commit_message>
<xml_diff>
--- a/Camera.Shop.pptx
+++ b/Camera.Shop.pptx
@@ -7,7 +7,8 @@
   <p:sldIdLst>
     <p:sldId id="256" r:id="rId2"/>
     <p:sldId id="257" r:id="rId3"/>
-    <p:sldId id="258" r:id="rId4"/>
+    <p:sldId id="259" r:id="rId4"/>
+    <p:sldId id="258" r:id="rId5"/>
   </p:sldIdLst>
   <p:sldSz cx="12192000" cy="6858000"/>
   <p:notesSz cx="6858000" cy="9144000"/>
@@ -261,7 +262,7 @@
           <a:p>
             <a:fld id="{1C0CA69E-655A-411A-BFB7-3B2417C08202}" type="datetimeFigureOut">
               <a:rPr lang="es-ES" smtClean="0"/>
-              <a:t>09/02/2019</a:t>
+              <a:t>12/02/2019</a:t>
             </a:fld>
             <a:endParaRPr lang="es-ES"/>
           </a:p>
@@ -459,7 +460,7 @@
           <a:p>
             <a:fld id="{1C0CA69E-655A-411A-BFB7-3B2417C08202}" type="datetimeFigureOut">
               <a:rPr lang="es-ES" smtClean="0"/>
-              <a:t>09/02/2019</a:t>
+              <a:t>12/02/2019</a:t>
             </a:fld>
             <a:endParaRPr lang="es-ES"/>
           </a:p>
@@ -667,7 +668,7 @@
           <a:p>
             <a:fld id="{1C0CA69E-655A-411A-BFB7-3B2417C08202}" type="datetimeFigureOut">
               <a:rPr lang="es-ES" smtClean="0"/>
-              <a:t>09/02/2019</a:t>
+              <a:t>12/02/2019</a:t>
             </a:fld>
             <a:endParaRPr lang="es-ES"/>
           </a:p>
@@ -865,7 +866,7 @@
           <a:p>
             <a:fld id="{1C0CA69E-655A-411A-BFB7-3B2417C08202}" type="datetimeFigureOut">
               <a:rPr lang="es-ES" smtClean="0"/>
-              <a:t>09/02/2019</a:t>
+              <a:t>12/02/2019</a:t>
             </a:fld>
             <a:endParaRPr lang="es-ES"/>
           </a:p>
@@ -1140,7 +1141,7 @@
           <a:p>
             <a:fld id="{1C0CA69E-655A-411A-BFB7-3B2417C08202}" type="datetimeFigureOut">
               <a:rPr lang="es-ES" smtClean="0"/>
-              <a:t>09/02/2019</a:t>
+              <a:t>12/02/2019</a:t>
             </a:fld>
             <a:endParaRPr lang="es-ES"/>
           </a:p>
@@ -1405,7 +1406,7 @@
           <a:p>
             <a:fld id="{1C0CA69E-655A-411A-BFB7-3B2417C08202}" type="datetimeFigureOut">
               <a:rPr lang="es-ES" smtClean="0"/>
-              <a:t>09/02/2019</a:t>
+              <a:t>12/02/2019</a:t>
             </a:fld>
             <a:endParaRPr lang="es-ES"/>
           </a:p>
@@ -1817,7 +1818,7 @@
           <a:p>
             <a:fld id="{1C0CA69E-655A-411A-BFB7-3B2417C08202}" type="datetimeFigureOut">
               <a:rPr lang="es-ES" smtClean="0"/>
-              <a:t>09/02/2019</a:t>
+              <a:t>12/02/2019</a:t>
             </a:fld>
             <a:endParaRPr lang="es-ES"/>
           </a:p>
@@ -1958,7 +1959,7 @@
           <a:p>
             <a:fld id="{1C0CA69E-655A-411A-BFB7-3B2417C08202}" type="datetimeFigureOut">
               <a:rPr lang="es-ES" smtClean="0"/>
-              <a:t>09/02/2019</a:t>
+              <a:t>12/02/2019</a:t>
             </a:fld>
             <a:endParaRPr lang="es-ES"/>
           </a:p>
@@ -2071,7 +2072,7 @@
           <a:p>
             <a:fld id="{1C0CA69E-655A-411A-BFB7-3B2417C08202}" type="datetimeFigureOut">
               <a:rPr lang="es-ES" smtClean="0"/>
-              <a:t>09/02/2019</a:t>
+              <a:t>12/02/2019</a:t>
             </a:fld>
             <a:endParaRPr lang="es-ES"/>
           </a:p>
@@ -2382,7 +2383,7 @@
           <a:p>
             <a:fld id="{1C0CA69E-655A-411A-BFB7-3B2417C08202}" type="datetimeFigureOut">
               <a:rPr lang="es-ES" smtClean="0"/>
-              <a:t>09/02/2019</a:t>
+              <a:t>12/02/2019</a:t>
             </a:fld>
             <a:endParaRPr lang="es-ES"/>
           </a:p>
@@ -2670,7 +2671,7 @@
           <a:p>
             <a:fld id="{1C0CA69E-655A-411A-BFB7-3B2417C08202}" type="datetimeFigureOut">
               <a:rPr lang="es-ES" smtClean="0"/>
-              <a:t>09/02/2019</a:t>
+              <a:t>12/02/2019</a:t>
             </a:fld>
             <a:endParaRPr lang="es-ES"/>
           </a:p>
@@ -2911,7 +2912,7 @@
           <a:p>
             <a:fld id="{1C0CA69E-655A-411A-BFB7-3B2417C08202}" type="datetimeFigureOut">
               <a:rPr lang="es-ES" smtClean="0"/>
-              <a:t>09/02/2019</a:t>
+              <a:t>12/02/2019</a:t>
             </a:fld>
             <a:endParaRPr lang="es-ES"/>
           </a:p>
@@ -3971,17 +3972,25 @@
                   <a:schemeClr val="bg1"/>
                 </a:solidFill>
               </a:rPr>
-              <a:t>Modelo entidad / relación</a:t>
+              <a:t>Modelo entidad / relación </a:t>
+            </a:r>
+            <a:r>
+              <a:rPr lang="es-ES" sz="3600" b="1" u="sng" dirty="0">
+                <a:solidFill>
+                  <a:schemeClr val="bg1"/>
+                </a:solidFill>
+              </a:rPr>
+              <a:t>de ASP.NET MVC</a:t>
             </a:r>
           </a:p>
         </p:txBody>
       </p:sp>
       <p:pic>
         <p:nvPicPr>
-          <p:cNvPr id="25" name="Imagen 24">
-            <a:extLst>
-              <a:ext uri="{FF2B5EF4-FFF2-40B4-BE49-F238E27FC236}">
-                <a16:creationId xmlns:a16="http://schemas.microsoft.com/office/drawing/2014/main" id="{7BFABBC9-CBE1-475F-AC8F-C1339B4E7B76}"/>
+          <p:cNvPr id="4" name="Imagen 3">
+            <a:extLst>
+              <a:ext uri="{FF2B5EF4-FFF2-40B4-BE49-F238E27FC236}">
+                <a16:creationId xmlns:a16="http://schemas.microsoft.com/office/drawing/2014/main" id="{ADFC3BBB-41F5-44BC-881B-83EC88D2D8B7}"/>
               </a:ext>
             </a:extLst>
           </p:cNvPr>
@@ -4004,8 +4013,8 @@
         </p:blipFill>
         <p:spPr>
           <a:xfrm>
-            <a:off x="1834095" y="1433548"/>
-            <a:ext cx="8523809" cy="5066667"/>
+            <a:off x="1776952" y="1854324"/>
+            <a:ext cx="8638095" cy="4323809"/>
           </a:xfrm>
           <a:prstGeom prst="rect">
             <a:avLst/>
@@ -4026,6 +4035,173 @@
 </file>
 
 <file path=ppt/slides/slide3.xml><?xml version="1.0" encoding="utf-8"?>
+<p:sld xmlns:a="http://schemas.openxmlformats.org/drawingml/2006/main" xmlns:r="http://schemas.openxmlformats.org/officeDocument/2006/relationships" xmlns:p="http://schemas.openxmlformats.org/presentationml/2006/main">
+  <p:cSld>
+    <p:spTree>
+      <p:nvGrpSpPr>
+        <p:cNvPr id="1" name=""/>
+        <p:cNvGrpSpPr/>
+        <p:nvPr/>
+      </p:nvGrpSpPr>
+      <p:grpSpPr>
+        <a:xfrm>
+          <a:off x="0" y="0"/>
+          <a:ext cx="0" cy="0"/>
+          <a:chOff x="0" y="0"/>
+          <a:chExt cx="0" cy="0"/>
+        </a:xfrm>
+      </p:grpSpPr>
+      <p:sp>
+        <p:nvSpPr>
+          <p:cNvPr id="17" name="Rectángulo 16">
+            <a:extLst>
+              <a:ext uri="{FF2B5EF4-FFF2-40B4-BE49-F238E27FC236}">
+                <a16:creationId xmlns:a16="http://schemas.microsoft.com/office/drawing/2014/main" id="{D3EB574D-AFF0-438B-BC14-4E592953DB69}"/>
+              </a:ext>
+            </a:extLst>
+          </p:cNvPr>
+          <p:cNvSpPr/>
+          <p:nvPr/>
+        </p:nvSpPr>
+        <p:spPr>
+          <a:xfrm>
+            <a:off x="0" y="1"/>
+            <a:ext cx="12192000" cy="1046442"/>
+          </a:xfrm>
+          <a:prstGeom prst="rect">
+            <a:avLst/>
+          </a:prstGeom>
+          <a:solidFill>
+            <a:schemeClr val="accent5">
+              <a:lumMod val="75000"/>
+            </a:schemeClr>
+          </a:solidFill>
+          <a:ln>
+            <a:noFill/>
+          </a:ln>
+        </p:spPr>
+        <p:style>
+          <a:lnRef idx="2">
+            <a:schemeClr val="accent1">
+              <a:shade val="50000"/>
+            </a:schemeClr>
+          </a:lnRef>
+          <a:fillRef idx="1">
+            <a:schemeClr val="accent1"/>
+          </a:fillRef>
+          <a:effectRef idx="0">
+            <a:schemeClr val="accent1"/>
+          </a:effectRef>
+          <a:fontRef idx="minor">
+            <a:schemeClr val="lt1"/>
+          </a:fontRef>
+        </p:style>
+        <p:txBody>
+          <a:bodyPr rtlCol="0" anchor="ctr"/>
+          <a:lstStyle/>
+          <a:p>
+            <a:pPr algn="ctr"/>
+            <a:endParaRPr lang="es-ES"/>
+          </a:p>
+        </p:txBody>
+      </p:sp>
+      <p:sp>
+        <p:nvSpPr>
+          <p:cNvPr id="2" name="Título 1">
+            <a:extLst>
+              <a:ext uri="{FF2B5EF4-FFF2-40B4-BE49-F238E27FC236}">
+                <a16:creationId xmlns:a16="http://schemas.microsoft.com/office/drawing/2014/main" id="{C30087AE-2DD3-48CD-A78C-BA5CDBD76431}"/>
+              </a:ext>
+            </a:extLst>
+          </p:cNvPr>
+          <p:cNvSpPr>
+            <a:spLocks noGrp="1"/>
+          </p:cNvSpPr>
+          <p:nvPr>
+            <p:ph type="title"/>
+          </p:nvPr>
+        </p:nvSpPr>
+        <p:spPr>
+          <a:xfrm>
+            <a:off x="257288" y="86061"/>
+            <a:ext cx="10515600" cy="960382"/>
+          </a:xfrm>
+        </p:spPr>
+        <p:txBody>
+          <a:bodyPr>
+            <a:normAutofit/>
+          </a:bodyPr>
+          <a:lstStyle/>
+          <a:p>
+            <a:r>
+              <a:rPr lang="es-ES" sz="3600" dirty="0">
+                <a:solidFill>
+                  <a:schemeClr val="bg1"/>
+                </a:solidFill>
+              </a:rPr>
+              <a:t>Modelo entidad / relación </a:t>
+            </a:r>
+            <a:r>
+              <a:rPr lang="es-ES" sz="3600" b="1" u="sng" dirty="0">
+                <a:solidFill>
+                  <a:schemeClr val="bg1"/>
+                </a:solidFill>
+              </a:rPr>
+              <a:t>de la tienda</a:t>
+            </a:r>
+          </a:p>
+        </p:txBody>
+      </p:sp>
+      <p:pic>
+        <p:nvPicPr>
+          <p:cNvPr id="25" name="Imagen 24">
+            <a:extLst>
+              <a:ext uri="{FF2B5EF4-FFF2-40B4-BE49-F238E27FC236}">
+                <a16:creationId xmlns:a16="http://schemas.microsoft.com/office/drawing/2014/main" id="{7BFABBC9-CBE1-475F-AC8F-C1339B4E7B76}"/>
+              </a:ext>
+            </a:extLst>
+          </p:cNvPr>
+          <p:cNvPicPr>
+            <a:picLocks noChangeAspect="1"/>
+          </p:cNvPicPr>
+          <p:nvPr/>
+        </p:nvPicPr>
+        <p:blipFill>
+          <a:blip r:embed="rId2">
+            <a:extLst>
+              <a:ext uri="{28A0092B-C50C-407E-A947-70E740481C1C}">
+                <a14:useLocalDpi xmlns:a14="http://schemas.microsoft.com/office/drawing/2010/main" val="0"/>
+              </a:ext>
+            </a:extLst>
+          </a:blip>
+          <a:stretch>
+            <a:fillRect/>
+          </a:stretch>
+        </p:blipFill>
+        <p:spPr>
+          <a:xfrm>
+            <a:off x="1834095" y="1433548"/>
+            <a:ext cx="8523809" cy="5066667"/>
+          </a:xfrm>
+          <a:prstGeom prst="rect">
+            <a:avLst/>
+          </a:prstGeom>
+        </p:spPr>
+      </p:pic>
+    </p:spTree>
+    <p:extLst>
+      <p:ext uri="{BB962C8B-B14F-4D97-AF65-F5344CB8AC3E}">
+        <p14:creationId xmlns:p14="http://schemas.microsoft.com/office/powerpoint/2010/main" val="2699757854"/>
+      </p:ext>
+    </p:extLst>
+  </p:cSld>
+  <p:clrMapOvr>
+    <a:masterClrMapping/>
+  </p:clrMapOvr>
+</p:sld>
+</file>
+
+<file path=ppt/slides/slide4.xml><?xml version="1.0" encoding="utf-8"?>
 <p:sld xmlns:a="http://schemas.openxmlformats.org/drawingml/2006/main" xmlns:r="http://schemas.openxmlformats.org/officeDocument/2006/relationships" xmlns:p="http://schemas.openxmlformats.org/presentationml/2006/main">
   <p:cSld>
     <p:spTree>

</xml_diff>

<commit_message>
Modificación del power point
</commit_message>
<xml_diff>
--- a/Camera.Shop.pptx
+++ b/Camera.Shop.pptx
@@ -11,7 +11,8 @@
     <p:sldId id="257" r:id="rId5"/>
     <p:sldId id="259" r:id="rId6"/>
     <p:sldId id="260" r:id="rId7"/>
-    <p:sldId id="264" r:id="rId8"/>
+    <p:sldId id="265" r:id="rId8"/>
+    <p:sldId id="264" r:id="rId9"/>
   </p:sldIdLst>
   <p:sldSz cx="12192000" cy="6858000"/>
   <p:notesSz cx="6858000" cy="9144000"/>
@@ -265,7 +266,7 @@
           <a:p>
             <a:fld id="{1C0CA69E-655A-411A-BFB7-3B2417C08202}" type="datetimeFigureOut">
               <a:rPr lang="es-ES" smtClean="0"/>
-              <a:t>12/02/2019</a:t>
+              <a:t>15/02/2019</a:t>
             </a:fld>
             <a:endParaRPr lang="es-ES"/>
           </a:p>
@@ -463,7 +464,7 @@
           <a:p>
             <a:fld id="{1C0CA69E-655A-411A-BFB7-3B2417C08202}" type="datetimeFigureOut">
               <a:rPr lang="es-ES" smtClean="0"/>
-              <a:t>12/02/2019</a:t>
+              <a:t>15/02/2019</a:t>
             </a:fld>
             <a:endParaRPr lang="es-ES"/>
           </a:p>
@@ -671,7 +672,7 @@
           <a:p>
             <a:fld id="{1C0CA69E-655A-411A-BFB7-3B2417C08202}" type="datetimeFigureOut">
               <a:rPr lang="es-ES" smtClean="0"/>
-              <a:t>12/02/2019</a:t>
+              <a:t>15/02/2019</a:t>
             </a:fld>
             <a:endParaRPr lang="es-ES"/>
           </a:p>
@@ -869,7 +870,7 @@
           <a:p>
             <a:fld id="{1C0CA69E-655A-411A-BFB7-3B2417C08202}" type="datetimeFigureOut">
               <a:rPr lang="es-ES" smtClean="0"/>
-              <a:t>12/02/2019</a:t>
+              <a:t>15/02/2019</a:t>
             </a:fld>
             <a:endParaRPr lang="es-ES"/>
           </a:p>
@@ -1144,7 +1145,7 @@
           <a:p>
             <a:fld id="{1C0CA69E-655A-411A-BFB7-3B2417C08202}" type="datetimeFigureOut">
               <a:rPr lang="es-ES" smtClean="0"/>
-              <a:t>12/02/2019</a:t>
+              <a:t>15/02/2019</a:t>
             </a:fld>
             <a:endParaRPr lang="es-ES"/>
           </a:p>
@@ -1409,7 +1410,7 @@
           <a:p>
             <a:fld id="{1C0CA69E-655A-411A-BFB7-3B2417C08202}" type="datetimeFigureOut">
               <a:rPr lang="es-ES" smtClean="0"/>
-              <a:t>12/02/2019</a:t>
+              <a:t>15/02/2019</a:t>
             </a:fld>
             <a:endParaRPr lang="es-ES"/>
           </a:p>
@@ -1821,7 +1822,7 @@
           <a:p>
             <a:fld id="{1C0CA69E-655A-411A-BFB7-3B2417C08202}" type="datetimeFigureOut">
               <a:rPr lang="es-ES" smtClean="0"/>
-              <a:t>12/02/2019</a:t>
+              <a:t>15/02/2019</a:t>
             </a:fld>
             <a:endParaRPr lang="es-ES"/>
           </a:p>
@@ -1962,7 +1963,7 @@
           <a:p>
             <a:fld id="{1C0CA69E-655A-411A-BFB7-3B2417C08202}" type="datetimeFigureOut">
               <a:rPr lang="es-ES" smtClean="0"/>
-              <a:t>12/02/2019</a:t>
+              <a:t>15/02/2019</a:t>
             </a:fld>
             <a:endParaRPr lang="es-ES"/>
           </a:p>
@@ -2075,7 +2076,7 @@
           <a:p>
             <a:fld id="{1C0CA69E-655A-411A-BFB7-3B2417C08202}" type="datetimeFigureOut">
               <a:rPr lang="es-ES" smtClean="0"/>
-              <a:t>12/02/2019</a:t>
+              <a:t>15/02/2019</a:t>
             </a:fld>
             <a:endParaRPr lang="es-ES"/>
           </a:p>
@@ -2386,7 +2387,7 @@
           <a:p>
             <a:fld id="{1C0CA69E-655A-411A-BFB7-3B2417C08202}" type="datetimeFigureOut">
               <a:rPr lang="es-ES" smtClean="0"/>
-              <a:t>12/02/2019</a:t>
+              <a:t>15/02/2019</a:t>
             </a:fld>
             <a:endParaRPr lang="es-ES"/>
           </a:p>
@@ -2674,7 +2675,7 @@
           <a:p>
             <a:fld id="{1C0CA69E-655A-411A-BFB7-3B2417C08202}" type="datetimeFigureOut">
               <a:rPr lang="es-ES" smtClean="0"/>
-              <a:t>12/02/2019</a:t>
+              <a:t>15/02/2019</a:t>
             </a:fld>
             <a:endParaRPr lang="es-ES"/>
           </a:p>
@@ -2915,7 +2916,7 @@
           <a:p>
             <a:fld id="{1C0CA69E-655A-411A-BFB7-3B2417C08202}" type="datetimeFigureOut">
               <a:rPr lang="es-ES" smtClean="0"/>
-              <a:t>12/02/2019</a:t>
+              <a:t>15/02/2019</a:t>
             </a:fld>
             <a:endParaRPr lang="es-ES"/>
           </a:p>
@@ -3514,7 +3515,7 @@
                 <a14:useLocalDpi xmlns:a14="http://schemas.microsoft.com/office/drawing/2010/main" val="0"/>
               </a:ext>
               <a:ext uri="{96DAC541-7B7A-43D3-8B79-37D633B846F1}">
-                <asvg:svgBlip xmlns:asvg="http://schemas.microsoft.com/office/drawing/2016/SVG/main" xmlns="" r:embed="rId3"/>
+                <asvg:svgBlip xmlns:asvg="http://schemas.microsoft.com/office/drawing/2016/SVG/main" r:embed="rId3"/>
               </a:ext>
             </a:extLst>
           </a:blip>
@@ -3963,7 +3964,7 @@
                 <a14:useLocalDpi xmlns:a14="http://schemas.microsoft.com/office/drawing/2010/main" val="0"/>
               </a:ext>
               <a:ext uri="{96DAC541-7B7A-43D3-8B79-37D633B846F1}">
-                <asvg:svgBlip xmlns:asvg="http://schemas.microsoft.com/office/drawing/2016/SVG/main" xmlns="" r:embed="rId3"/>
+                <asvg:svgBlip xmlns:asvg="http://schemas.microsoft.com/office/drawing/2016/SVG/main" r:embed="rId3"/>
               </a:ext>
             </a:extLst>
           </a:blip>
@@ -4010,18 +4011,13 @@
           <a:lstStyle/>
           <a:p>
             <a:r>
-              <a:rPr lang="es-ES" sz="3600" dirty="0" smtClean="0">
+              <a:rPr lang="es-ES" sz="3600" dirty="0">
                 <a:solidFill>
                   <a:schemeClr val="bg1"/>
                 </a:solidFill>
               </a:rPr>
               <a:t>¿En qué consiste la aplicación?</a:t>
             </a:r>
-            <a:endParaRPr lang="es-ES" sz="3600" dirty="0">
-              <a:solidFill>
-                <a:schemeClr val="bg1"/>
-              </a:solidFill>
-            </a:endParaRPr>
           </a:p>
         </p:txBody>
       </p:sp>
@@ -4035,13 +4031,6 @@
   <p:clrMapOvr>
     <a:masterClrMapping/>
   </p:clrMapOvr>
-  <p:timing>
-    <p:tnLst>
-      <p:par>
-        <p:cTn id="1" dur="indefinite" restart="never" nodeType="tmRoot"/>
-      </p:par>
-    </p:tnLst>
-  </p:timing>
 </p:sld>
 </file>
 
@@ -4138,7 +4127,7 @@
                 <a14:useLocalDpi xmlns:a14="http://schemas.microsoft.com/office/drawing/2010/main" val="0"/>
               </a:ext>
               <a:ext uri="{96DAC541-7B7A-43D3-8B79-37D633B846F1}">
-                <asvg:svgBlip xmlns:asvg="http://schemas.microsoft.com/office/drawing/2016/SVG/main" xmlns="" r:embed="rId3"/>
+                <asvg:svgBlip xmlns:asvg="http://schemas.microsoft.com/office/drawing/2016/SVG/main" r:embed="rId3"/>
               </a:ext>
             </a:extLst>
           </a:blip>
@@ -4185,18 +4174,13 @@
           <a:lstStyle/>
           <a:p>
             <a:r>
-              <a:rPr lang="es-ES" sz="3600" dirty="0" smtClean="0">
+              <a:rPr lang="es-ES" sz="3600" dirty="0">
                 <a:solidFill>
                   <a:schemeClr val="bg1"/>
                 </a:solidFill>
               </a:rPr>
               <a:t>Tecnologías utilizadas</a:t>
             </a:r>
-            <a:endParaRPr lang="es-ES" sz="3600" dirty="0">
-              <a:solidFill>
-                <a:schemeClr val="bg1"/>
-              </a:solidFill>
-            </a:endParaRPr>
           </a:p>
         </p:txBody>
       </p:sp>
@@ -4210,13 +4194,6 @@
   <p:clrMapOvr>
     <a:masterClrMapping/>
   </p:clrMapOvr>
-  <p:timing>
-    <p:tnLst>
-      <p:par>
-        <p:cTn id="1" dur="indefinite" restart="never" nodeType="tmRoot"/>
-      </p:par>
-    </p:tnLst>
-  </p:timing>
 </p:sld>
 </file>
 
@@ -4384,13 +4361,6 @@
   <p:clrMapOvr>
     <a:masterClrMapping/>
   </p:clrMapOvr>
-  <p:timing>
-    <p:tnLst>
-      <p:par>
-        <p:cTn id="1" dur="indefinite" restart="never" nodeType="tmRoot"/>
-      </p:par>
-    </p:tnLst>
-  </p:timing>
 </p:sld>
 </file>
 
@@ -4558,13 +4528,6 @@
   <p:clrMapOvr>
     <a:masterClrMapping/>
   </p:clrMapOvr>
-  <p:timing>
-    <p:tnLst>
-      <p:par>
-        <p:cTn id="1" dur="indefinite" restart="never" nodeType="tmRoot"/>
-      </p:par>
-    </p:tnLst>
-  </p:timing>
 </p:sld>
 </file>
 
@@ -4661,7 +4624,7 @@
                 <a14:useLocalDpi xmlns:a14="http://schemas.microsoft.com/office/drawing/2010/main" val="0"/>
               </a:ext>
               <a:ext uri="{96DAC541-7B7A-43D3-8B79-37D633B846F1}">
-                <asvg:svgBlip xmlns:asvg="http://schemas.microsoft.com/office/drawing/2016/SVG/main" xmlns="" r:embed="rId3"/>
+                <asvg:svgBlip xmlns:asvg="http://schemas.microsoft.com/office/drawing/2016/SVG/main" r:embed="rId3"/>
               </a:ext>
             </a:extLst>
           </a:blip>
@@ -4713,7 +4676,15 @@
                   <a:schemeClr val="bg1"/>
                 </a:solidFill>
               </a:rPr>
-              <a:t>Modelo entidad / relación</a:t>
+              <a:t>Casos de uso </a:t>
+            </a:r>
+            <a:r>
+              <a:rPr lang="es-ES" sz="3600" b="1" dirty="0">
+                <a:solidFill>
+                  <a:schemeClr val="bg1"/>
+                </a:solidFill>
+              </a:rPr>
+              <a:t>más relevantes</a:t>
             </a:r>
           </a:p>
         </p:txBody>
@@ -4728,13 +4699,6 @@
   <p:clrMapOvr>
     <a:masterClrMapping/>
   </p:clrMapOvr>
-  <p:timing>
-    <p:tnLst>
-      <p:par>
-        <p:cTn id="1" dur="indefinite" restart="never" nodeType="tmRoot"/>
-      </p:par>
-    </p:tnLst>
-  </p:timing>
 </p:sld>
 </file>
 
@@ -4755,6 +4719,60 @@
           <a:chExt cx="0" cy="0"/>
         </a:xfrm>
       </p:grpSpPr>
+      <p:sp>
+        <p:nvSpPr>
+          <p:cNvPr id="17" name="Rectángulo 16">
+            <a:extLst>
+              <a:ext uri="{FF2B5EF4-FFF2-40B4-BE49-F238E27FC236}">
+                <a16:creationId xmlns:a16="http://schemas.microsoft.com/office/drawing/2014/main" id="{D3EB574D-AFF0-438B-BC14-4E592953DB69}"/>
+              </a:ext>
+            </a:extLst>
+          </p:cNvPr>
+          <p:cNvSpPr/>
+          <p:nvPr/>
+        </p:nvSpPr>
+        <p:spPr>
+          <a:xfrm>
+            <a:off x="0" y="1"/>
+            <a:ext cx="12192000" cy="1046442"/>
+          </a:xfrm>
+          <a:prstGeom prst="rect">
+            <a:avLst/>
+          </a:prstGeom>
+          <a:solidFill>
+            <a:schemeClr val="accent5">
+              <a:lumMod val="75000"/>
+            </a:schemeClr>
+          </a:solidFill>
+          <a:ln>
+            <a:noFill/>
+          </a:ln>
+        </p:spPr>
+        <p:style>
+          <a:lnRef idx="2">
+            <a:schemeClr val="accent1">
+              <a:shade val="50000"/>
+            </a:schemeClr>
+          </a:lnRef>
+          <a:fillRef idx="1">
+            <a:schemeClr val="accent1"/>
+          </a:fillRef>
+          <a:effectRef idx="0">
+            <a:schemeClr val="accent1"/>
+          </a:effectRef>
+          <a:fontRef idx="minor">
+            <a:schemeClr val="lt1"/>
+          </a:fontRef>
+        </p:style>
+        <p:txBody>
+          <a:bodyPr rtlCol="0" anchor="ctr"/>
+          <a:lstStyle/>
+          <a:p>
+            <a:pPr algn="ctr"/>
+            <a:endParaRPr lang="es-ES"/>
+          </a:p>
+        </p:txBody>
+      </p:sp>
       <p:pic>
         <p:nvPicPr>
           <p:cNvPr id="4" name="Gráfico 3">
@@ -4770,14 +4788,14 @@
           <p:nvPr/>
         </p:nvPicPr>
         <p:blipFill>
-          <a:blip r:embed="rId2">
+          <a:blip r:embed="rId3">
             <a:alphaModFix amt="10000"/>
             <a:extLst>
               <a:ext uri="{28A0092B-C50C-407E-A947-70E740481C1C}">
                 <a14:useLocalDpi xmlns:a14="http://schemas.microsoft.com/office/drawing/2010/main" val="0"/>
               </a:ext>
               <a:ext uri="{96DAC541-7B7A-43D3-8B79-37D633B846F1}">
-                <asvg:svgBlip xmlns:asvg="http://schemas.microsoft.com/office/drawing/2016/SVG/main" xmlns="" r:embed="rId3"/>
+                <asvg:svgBlip xmlns:asvg="http://schemas.microsoft.com/office/drawing/2016/SVG/main" r:embed="rId4"/>
               </a:ext>
             </a:extLst>
           </a:blip>
@@ -4797,7 +4815,13 @@
       </p:pic>
       <p:sp>
         <p:nvSpPr>
-          <p:cNvPr id="3" name="Título 2"/>
+          <p:cNvPr id="2" name="Título 1">
+            <a:extLst>
+              <a:ext uri="{FF2B5EF4-FFF2-40B4-BE49-F238E27FC236}">
+                <a16:creationId xmlns:a16="http://schemas.microsoft.com/office/drawing/2014/main" id="{C30087AE-2DD3-48CD-A78C-BA5CDBD76431}"/>
+              </a:ext>
+            </a:extLst>
+          </p:cNvPr>
           <p:cNvSpPr>
             <a:spLocks noGrp="1"/>
           </p:cNvSpPr>
@@ -4807,7 +4831,178 @@
         </p:nvSpPr>
         <p:spPr>
           <a:xfrm>
-            <a:off x="4355868" y="1976501"/>
+            <a:off x="257288" y="86061"/>
+            <a:ext cx="10515600" cy="960382"/>
+          </a:xfrm>
+        </p:spPr>
+        <p:txBody>
+          <a:bodyPr>
+            <a:normAutofit/>
+          </a:bodyPr>
+          <a:lstStyle/>
+          <a:p>
+            <a:r>
+              <a:rPr lang="es-ES" sz="3600" dirty="0">
+                <a:solidFill>
+                  <a:schemeClr val="bg1"/>
+                </a:solidFill>
+              </a:rPr>
+              <a:t>Planificación (diagrama de Gantt)</a:t>
+            </a:r>
+            <a:endParaRPr lang="es-ES" sz="3600" b="1" dirty="0">
+              <a:solidFill>
+                <a:schemeClr val="bg1"/>
+              </a:solidFill>
+            </a:endParaRPr>
+          </a:p>
+        </p:txBody>
+      </p:sp>
+      <p:graphicFrame>
+        <p:nvGraphicFramePr>
+          <p:cNvPr id="5" name="Objeto 4">
+            <a:extLst>
+              <a:ext uri="{FF2B5EF4-FFF2-40B4-BE49-F238E27FC236}">
+                <a16:creationId xmlns:a16="http://schemas.microsoft.com/office/drawing/2014/main" id="{65F617F6-C2E1-44C0-A748-8DDDA11AE83A}"/>
+              </a:ext>
+            </a:extLst>
+          </p:cNvPr>
+          <p:cNvGraphicFramePr>
+            <a:graphicFrameLocks noChangeAspect="1"/>
+          </p:cNvGraphicFramePr>
+          <p:nvPr>
+            <p:extLst>
+              <p:ext uri="{D42A27DB-BD31-4B8C-83A1-F6EECF244321}">
+                <p14:modId xmlns:p14="http://schemas.microsoft.com/office/powerpoint/2010/main" val="1673137858"/>
+              </p:ext>
+            </p:extLst>
+          </p:nvPr>
+        </p:nvGraphicFramePr>
+        <p:xfrm>
+          <a:off x="1075669" y="1312635"/>
+          <a:ext cx="10040662" cy="5274777"/>
+        </p:xfrm>
+        <a:graphic>
+          <a:graphicData uri="http://schemas.openxmlformats.org/presentationml/2006/ole">
+            <mc:AlternateContent xmlns:mc="http://schemas.openxmlformats.org/markup-compatibility/2006">
+              <mc:Choice xmlns:v="urn:schemas-microsoft-com:vml" Requires="v">
+                <p:oleObj spid="_x0000_s1033" name="Worksheet" r:id="rId5" imgW="11572799" imgH="5343679" progId="Excel.Sheet.12">
+                  <p:embed/>
+                </p:oleObj>
+              </mc:Choice>
+              <mc:Fallback>
+                <p:oleObj name="Worksheet" r:id="rId5" imgW="11572799" imgH="5343679" progId="Excel.Sheet.12">
+                  <p:embed/>
+                  <p:pic>
+                    <p:nvPicPr>
+                      <p:cNvPr id="0" name=""/>
+                      <p:cNvPicPr preferRelativeResize="0"/>
+                      <p:nvPr/>
+                    </p:nvPicPr>
+                    <p:blipFill>
+                      <a:blip r:embed="rId6"/>
+                      <a:stretch>
+                        <a:fillRect/>
+                      </a:stretch>
+                    </p:blipFill>
+                    <p:spPr>
+                      <a:xfrm>
+                        <a:off x="1075669" y="1312635"/>
+                        <a:ext cx="10040662" cy="5274777"/>
+                      </a:xfrm>
+                      <a:prstGeom prst="rect">
+                        <a:avLst/>
+                      </a:prstGeom>
+                    </p:spPr>
+                  </p:pic>
+                </p:oleObj>
+              </mc:Fallback>
+            </mc:AlternateContent>
+          </a:graphicData>
+        </a:graphic>
+      </p:graphicFrame>
+    </p:spTree>
+    <p:extLst>
+      <p:ext uri="{BB962C8B-B14F-4D97-AF65-F5344CB8AC3E}">
+        <p14:creationId xmlns:p14="http://schemas.microsoft.com/office/powerpoint/2010/main" val="2021353306"/>
+      </p:ext>
+    </p:extLst>
+  </p:cSld>
+  <p:clrMapOvr>
+    <a:masterClrMapping/>
+  </p:clrMapOvr>
+</p:sld>
+</file>
+
+<file path=ppt/slides/slide8.xml><?xml version="1.0" encoding="utf-8"?>
+<p:sld xmlns:a="http://schemas.openxmlformats.org/drawingml/2006/main" xmlns:r="http://schemas.openxmlformats.org/officeDocument/2006/relationships" xmlns:p="http://schemas.openxmlformats.org/presentationml/2006/main">
+  <p:cSld>
+    <p:spTree>
+      <p:nvGrpSpPr>
+        <p:cNvPr id="1" name=""/>
+        <p:cNvGrpSpPr/>
+        <p:nvPr/>
+      </p:nvGrpSpPr>
+      <p:grpSpPr>
+        <a:xfrm>
+          <a:off x="0" y="0"/>
+          <a:ext cx="0" cy="0"/>
+          <a:chOff x="0" y="0"/>
+          <a:chExt cx="0" cy="0"/>
+        </a:xfrm>
+      </p:grpSpPr>
+      <p:pic>
+        <p:nvPicPr>
+          <p:cNvPr id="4" name="Gráfico 3">
+            <a:extLst>
+              <a:ext uri="{FF2B5EF4-FFF2-40B4-BE49-F238E27FC236}">
+                <a16:creationId xmlns:a16="http://schemas.microsoft.com/office/drawing/2014/main" id="{4EC377F4-23E6-4039-AAC3-B053F17FEB6A}"/>
+              </a:ext>
+            </a:extLst>
+          </p:cNvPr>
+          <p:cNvPicPr>
+            <a:picLocks noChangeAspect="1"/>
+          </p:cNvPicPr>
+          <p:nvPr/>
+        </p:nvPicPr>
+        <p:blipFill>
+          <a:blip r:embed="rId2">
+            <a:alphaModFix amt="10000"/>
+            <a:extLst>
+              <a:ext uri="{28A0092B-C50C-407E-A947-70E740481C1C}">
+                <a14:useLocalDpi xmlns:a14="http://schemas.microsoft.com/office/drawing/2010/main" val="0"/>
+              </a:ext>
+              <a:ext uri="{96DAC541-7B7A-43D3-8B79-37D633B846F1}">
+                <asvg:svgBlip xmlns:asvg="http://schemas.microsoft.com/office/drawing/2016/SVG/main" r:embed="rId3"/>
+              </a:ext>
+            </a:extLst>
+          </a:blip>
+          <a:stretch>
+            <a:fillRect/>
+          </a:stretch>
+        </p:blipFill>
+        <p:spPr>
+          <a:xfrm>
+            <a:off x="-120473" y="2875877"/>
+            <a:ext cx="9780452" cy="4377607"/>
+          </a:xfrm>
+          <a:prstGeom prst="rect">
+            <a:avLst/>
+          </a:prstGeom>
+        </p:spPr>
+      </p:pic>
+      <p:sp>
+        <p:nvSpPr>
+          <p:cNvPr id="3" name="Título 2"/>
+          <p:cNvSpPr>
+            <a:spLocks noGrp="1"/>
+          </p:cNvSpPr>
+          <p:nvPr>
+            <p:ph type="title"/>
+          </p:nvPr>
+        </p:nvSpPr>
+        <p:spPr>
+          <a:xfrm>
+            <a:off x="4112588" y="1548662"/>
             <a:ext cx="6731924" cy="684848"/>
           </a:xfrm>
         </p:spPr>
@@ -4818,13 +5013,51 @@
           <a:lstStyle/>
           <a:p>
             <a:r>
-              <a:rPr lang="es-ES_tradnl" sz="4000" dirty="0" smtClean="0"/>
+              <a:rPr lang="es-ES_tradnl" sz="4000" b="1" dirty="0"/>
               <a:t>Muchas gracias por tu atención.</a:t>
             </a:r>
-            <a:endParaRPr lang="es-ES_tradnl" sz="4000" dirty="0"/>
-          </a:p>
-        </p:txBody>
-      </p:sp>
+          </a:p>
+        </p:txBody>
+      </p:sp>
+      <p:pic>
+        <p:nvPicPr>
+          <p:cNvPr id="5" name="Gráfico 4">
+            <a:extLst>
+              <a:ext uri="{FF2B5EF4-FFF2-40B4-BE49-F238E27FC236}">
+                <a16:creationId xmlns:a16="http://schemas.microsoft.com/office/drawing/2014/main" id="{17A25C59-7B8C-4685-B247-2F2AD18D5F55}"/>
+              </a:ext>
+            </a:extLst>
+          </p:cNvPr>
+          <p:cNvPicPr>
+            <a:picLocks noChangeAspect="1"/>
+          </p:cNvPicPr>
+          <p:nvPr/>
+        </p:nvPicPr>
+        <p:blipFill>
+          <a:blip r:embed="rId4">
+            <a:extLst>
+              <a:ext uri="{28A0092B-C50C-407E-A947-70E740481C1C}">
+                <a14:useLocalDpi xmlns:a14="http://schemas.microsoft.com/office/drawing/2010/main" val="0"/>
+              </a:ext>
+              <a:ext uri="{96DAC541-7B7A-43D3-8B79-37D633B846F1}">
+                <asvg:svgBlip xmlns:asvg="http://schemas.microsoft.com/office/drawing/2016/SVG/main" r:embed="rId5"/>
+              </a:ext>
+            </a:extLst>
+          </a:blip>
+          <a:stretch>
+            <a:fillRect/>
+          </a:stretch>
+        </p:blipFill>
+        <p:spPr>
+          <a:xfrm>
+            <a:off x="2984803" y="1395296"/>
+            <a:ext cx="991579" cy="991579"/>
+          </a:xfrm>
+          <a:prstGeom prst="rect">
+            <a:avLst/>
+          </a:prstGeom>
+        </p:spPr>
+      </p:pic>
     </p:spTree>
     <p:extLst>
       <p:ext uri="{BB962C8B-B14F-4D97-AF65-F5344CB8AC3E}">
@@ -4835,13 +5068,6 @@
   <p:clrMapOvr>
     <a:masterClrMapping/>
   </p:clrMapOvr>
-  <p:timing>
-    <p:tnLst>
-      <p:par>
-        <p:cTn id="1" dur="indefinite" restart="never" nodeType="tmRoot"/>
-      </p:par>
-    </p:tnLst>
-  </p:timing>
 </p:sld>
 </file>
 

</xml_diff>

<commit_message>
Finalización de la presentación
</commit_message>
<xml_diff>
--- a/Camera.Shop.pptx
+++ b/Camera.Shop.pptx
@@ -3514,7 +3514,7 @@
                 <a14:useLocalDpi xmlns:a14="http://schemas.microsoft.com/office/drawing/2010/main" val="0"/>
               </a:ext>
               <a:ext uri="{96DAC541-7B7A-43D3-8B79-37D633B846F1}">
-                <asvg:svgBlip xmlns:asvg="http://schemas.microsoft.com/office/drawing/2016/SVG/main" xmlns="" r:embed="rId3"/>
+                <asvg:svgBlip xmlns:asvg="http://schemas.microsoft.com/office/drawing/2016/SVG/main" r:embed="rId3"/>
               </a:ext>
             </a:extLst>
           </a:blip>
@@ -3963,7 +3963,7 @@
                 <a14:useLocalDpi xmlns:a14="http://schemas.microsoft.com/office/drawing/2010/main" val="0"/>
               </a:ext>
               <a:ext uri="{96DAC541-7B7A-43D3-8B79-37D633B846F1}">
-                <asvg:svgBlip xmlns:asvg="http://schemas.microsoft.com/office/drawing/2016/SVG/main" xmlns="" r:embed="rId3"/>
+                <asvg:svgBlip xmlns:asvg="http://schemas.microsoft.com/office/drawing/2016/SVG/main" r:embed="rId3"/>
               </a:ext>
             </a:extLst>
           </a:blip>
@@ -4028,8 +4028,8 @@
         </p:nvSpPr>
         <p:spPr>
           <a:xfrm>
-            <a:off x="1720735" y="1670858"/>
-            <a:ext cx="506870" cy="369332"/>
+            <a:off x="597735" y="1306216"/>
+            <a:ext cx="11092441" cy="3139321"/>
           </a:xfrm>
           <a:prstGeom prst="rect">
             <a:avLst/>
@@ -4037,16 +4037,210 @@
           <a:noFill/>
         </p:spPr>
         <p:txBody>
-          <a:bodyPr wrap="none" rtlCol="0">
+          <a:bodyPr wrap="square" rtlCol="0">
             <a:spAutoFit/>
           </a:bodyPr>
           <a:lstStyle/>
           <a:p>
-            <a:r>
-              <a:rPr lang="es-ES_tradnl" dirty="0" err="1" smtClean="0"/>
-              <a:t>dsa</a:t>
+            <a:pPr marL="285750" indent="-285750">
+              <a:buFont typeface="Arial" panose="020B0604020202020204" pitchFamily="34" charset="0"/>
+              <a:buChar char="•"/>
+            </a:pPr>
+            <a:r>
+              <a:rPr lang="es-ES_tradnl" dirty="0"/>
+              <a:t>Aplicación web </a:t>
+            </a:r>
+            <a:r>
+              <a:rPr lang="es-ES_tradnl" b="1" dirty="0"/>
+              <a:t>ASP.NET</a:t>
+            </a:r>
+          </a:p>
+          <a:p>
+            <a:pPr marL="742950" lvl="1" indent="-285750">
+              <a:buFont typeface="Arial" panose="020B0604020202020204" pitchFamily="34" charset="0"/>
+              <a:buChar char="•"/>
+            </a:pPr>
+            <a:r>
+              <a:rPr lang="es-ES_tradnl" dirty="0"/>
+              <a:t>Técnica de </a:t>
+            </a:r>
+            <a:r>
+              <a:rPr lang="es-ES_tradnl" b="1" dirty="0" err="1"/>
+              <a:t>Database</a:t>
+            </a:r>
+            <a:r>
+              <a:rPr lang="es-ES_tradnl" b="1" dirty="0"/>
+              <a:t> </a:t>
+            </a:r>
+            <a:r>
+              <a:rPr lang="es-ES_tradnl" dirty="0" err="1"/>
+              <a:t>First</a:t>
             </a:r>
             <a:endParaRPr lang="es-ES_tradnl" dirty="0"/>
+          </a:p>
+          <a:p>
+            <a:pPr marL="1200150" lvl="2" indent="-285750">
+              <a:buFont typeface="Arial" panose="020B0604020202020204" pitchFamily="34" charset="0"/>
+              <a:buChar char="•"/>
+            </a:pPr>
+            <a:r>
+              <a:rPr lang="es-ES_tradnl" dirty="0"/>
+              <a:t>Se crea en primer lugar el modelo relacional.</a:t>
+            </a:r>
+            <a:endParaRPr lang="es-ES_tradnl" b="1" dirty="0"/>
+          </a:p>
+          <a:p>
+            <a:pPr marL="742950" lvl="1" indent="-285750">
+              <a:buFont typeface="Arial" panose="020B0604020202020204" pitchFamily="34" charset="0"/>
+              <a:buChar char="•"/>
+            </a:pPr>
+            <a:r>
+              <a:rPr lang="es-ES_tradnl" dirty="0"/>
+              <a:t>Se mapea la de base de datos con </a:t>
+            </a:r>
+            <a:r>
+              <a:rPr lang="es-ES_tradnl" b="1" dirty="0"/>
+              <a:t>ADO.NET </a:t>
+            </a:r>
+            <a:r>
+              <a:rPr lang="es-ES_tradnl" b="1" dirty="0" err="1"/>
+              <a:t>Entity</a:t>
+            </a:r>
+            <a:r>
+              <a:rPr lang="es-ES_tradnl" b="1" dirty="0"/>
+              <a:t> Data </a:t>
+            </a:r>
+            <a:r>
+              <a:rPr lang="es-ES_tradnl" b="1" dirty="0" err="1"/>
+              <a:t>Model</a:t>
+            </a:r>
+            <a:endParaRPr lang="es-ES_tradnl" b="1" dirty="0"/>
+          </a:p>
+          <a:p>
+            <a:pPr marL="1200150" lvl="2" indent="-285750">
+              <a:buFont typeface="Arial" panose="020B0604020202020204" pitchFamily="34" charset="0"/>
+              <a:buChar char="•"/>
+            </a:pPr>
+            <a:r>
+              <a:rPr lang="es-ES_tradnl" dirty="0"/>
+              <a:t>Se genera la entidad de modelo de datos de forma automatizada a partir de la base de datos del proyecto.</a:t>
+            </a:r>
+          </a:p>
+          <a:p>
+            <a:pPr marL="742950" lvl="1" indent="-285750">
+              <a:buFont typeface="Arial" panose="020B0604020202020204" pitchFamily="34" charset="0"/>
+              <a:buChar char="•"/>
+            </a:pPr>
+            <a:r>
+              <a:rPr lang="es-ES_tradnl" dirty="0"/>
+              <a:t>Acceso a los datos mediante </a:t>
+            </a:r>
+            <a:r>
+              <a:rPr lang="es-ES_tradnl" b="1" dirty="0"/>
+              <a:t>LINQ </a:t>
+            </a:r>
+            <a:r>
+              <a:rPr lang="es-ES_tradnl" dirty="0"/>
+              <a:t>(</a:t>
+            </a:r>
+            <a:r>
+              <a:rPr lang="es-ES_tradnl" dirty="0" err="1"/>
+              <a:t>Language</a:t>
+            </a:r>
+            <a:r>
+              <a:rPr lang="es-ES_tradnl" dirty="0"/>
+              <a:t> </a:t>
+            </a:r>
+            <a:r>
+              <a:rPr lang="es-ES_tradnl" dirty="0" err="1"/>
+              <a:t>Integrated</a:t>
+            </a:r>
+            <a:r>
+              <a:rPr lang="es-ES_tradnl" dirty="0"/>
+              <a:t> </a:t>
+            </a:r>
+            <a:r>
+              <a:rPr lang="es-ES_tradnl" dirty="0" err="1"/>
+              <a:t>Query</a:t>
+            </a:r>
+            <a:r>
+              <a:rPr lang="es-ES_tradnl" dirty="0"/>
+              <a:t>) </a:t>
+            </a:r>
+            <a:r>
+              <a:rPr lang="es-ES_tradnl" b="1" dirty="0" err="1"/>
+              <a:t>to</a:t>
+            </a:r>
+            <a:r>
+              <a:rPr lang="es-ES_tradnl" b="1" dirty="0"/>
+              <a:t> </a:t>
+            </a:r>
+            <a:r>
+              <a:rPr lang="es-ES_tradnl" b="1" dirty="0" err="1"/>
+              <a:t>Entities</a:t>
+            </a:r>
+            <a:r>
+              <a:rPr lang="es-ES_tradnl" b="1" dirty="0"/>
+              <a:t> </a:t>
+            </a:r>
+            <a:r>
+              <a:rPr lang="es-ES_tradnl" dirty="0"/>
+              <a:t>con consultas basadas en métodos con expresiones lambda.</a:t>
+            </a:r>
+          </a:p>
+          <a:p>
+            <a:pPr marL="742950" lvl="1" indent="-285750">
+              <a:buFont typeface="Arial" panose="020B0604020202020204" pitchFamily="34" charset="0"/>
+              <a:buChar char="•"/>
+            </a:pPr>
+            <a:r>
+              <a:rPr lang="es-ES_tradnl" dirty="0"/>
+              <a:t>Patrón </a:t>
+            </a:r>
+            <a:r>
+              <a:rPr lang="es-ES_tradnl" b="1" dirty="0"/>
+              <a:t>MVC</a:t>
+            </a:r>
+            <a:r>
+              <a:rPr lang="es-ES_tradnl" dirty="0"/>
+              <a:t> (Modelo - Vista - Controlador)</a:t>
+            </a:r>
+          </a:p>
+          <a:p>
+            <a:pPr marL="1200150" lvl="2" indent="-285750">
+              <a:buFont typeface="Arial" panose="020B0604020202020204" pitchFamily="34" charset="0"/>
+              <a:buChar char="•"/>
+            </a:pPr>
+            <a:r>
+              <a:rPr lang="es-ES_tradnl" u="sng" dirty="0"/>
+              <a:t>Vistas</a:t>
+            </a:r>
+          </a:p>
+          <a:p>
+            <a:pPr marL="1657350" lvl="3" indent="-285750">
+              <a:buFont typeface="Arial" panose="020B0604020202020204" pitchFamily="34" charset="0"/>
+              <a:buChar char="•"/>
+            </a:pPr>
+            <a:r>
+              <a:rPr lang="es-ES_tradnl" dirty="0"/>
+              <a:t>Uso del lenguaje o motor de vistas </a:t>
+            </a:r>
+            <a:r>
+              <a:rPr lang="es-ES_tradnl" b="1" dirty="0" err="1"/>
+              <a:t>Razor</a:t>
+            </a:r>
+            <a:r>
+              <a:rPr lang="es-ES_tradnl" dirty="0"/>
+              <a:t> (basado en </a:t>
+            </a:r>
+            <a:r>
+              <a:rPr lang="es-ES_tradnl" b="1" dirty="0"/>
+              <a:t>C#</a:t>
+            </a:r>
+            <a:r>
+              <a:rPr lang="es-ES_tradnl" dirty="0"/>
+              <a:t>).</a:t>
+            </a:r>
           </a:p>
         </p:txBody>
       </p:sp>
@@ -4060,13 +4254,6 @@
   <p:clrMapOvr>
     <a:masterClrMapping/>
   </p:clrMapOvr>
-  <p:timing>
-    <p:tnLst>
-      <p:par>
-        <p:cTn id="1" dur="indefinite" restart="never" nodeType="tmRoot"/>
-      </p:par>
-    </p:tnLst>
-  </p:timing>
 </p:sld>
 </file>
 
@@ -4163,7 +4350,7 @@
                 <a14:useLocalDpi xmlns:a14="http://schemas.microsoft.com/office/drawing/2010/main" val="0"/>
               </a:ext>
               <a:ext uri="{96DAC541-7B7A-43D3-8B79-37D633B846F1}">
-                <asvg:svgBlip xmlns:asvg="http://schemas.microsoft.com/office/drawing/2016/SVG/main" xmlns="" r:embed="rId3"/>
+                <asvg:svgBlip xmlns:asvg="http://schemas.microsoft.com/office/drawing/2016/SVG/main" r:embed="rId3"/>
               </a:ext>
             </a:extLst>
           </a:blip>
@@ -4210,26 +4397,13 @@
           <a:lstStyle/>
           <a:p>
             <a:r>
-              <a:rPr lang="es-ES" sz="3600" dirty="0" smtClean="0">
+              <a:rPr lang="es-ES" sz="3600" dirty="0">
                 <a:solidFill>
                   <a:schemeClr val="bg1"/>
                 </a:solidFill>
               </a:rPr>
-              <a:t>Requisitos de la </a:t>
-            </a:r>
-            <a:r>
-              <a:rPr lang="es-ES" sz="3600" dirty="0" smtClean="0">
-                <a:solidFill>
-                  <a:schemeClr val="bg1"/>
-                </a:solidFill>
-              </a:rPr>
-              <a:t>aplicación (según la especificación previa)</a:t>
-            </a:r>
-            <a:endParaRPr lang="es-ES" sz="3600" dirty="0">
-              <a:solidFill>
-                <a:schemeClr val="bg1"/>
-              </a:solidFill>
-            </a:endParaRPr>
+              <a:t>Requisitos de la aplicación (según la especificación previa)</a:t>
+            </a:r>
           </a:p>
         </p:txBody>
       </p:sp>
@@ -4271,8 +4445,8 @@
         </p:nvSpPr>
         <p:spPr>
           <a:xfrm>
-            <a:off x="257289" y="1306216"/>
-            <a:ext cx="11713039" cy="3139321"/>
+            <a:off x="265679" y="1306216"/>
+            <a:ext cx="11705412" cy="3139321"/>
           </a:xfrm>
           <a:prstGeom prst="rect">
             <a:avLst/>
@@ -4290,7 +4464,7 @@
               <a:buChar char="•"/>
             </a:pPr>
             <a:r>
-              <a:rPr lang="es-ES_tradnl" dirty="0" smtClean="0"/>
+              <a:rPr lang="es-ES_tradnl" dirty="0"/>
               <a:t>Filtrar los productos por categorías.</a:t>
             </a:r>
           </a:p>
@@ -4300,7 +4474,7 @@
               <a:buChar char="•"/>
             </a:pPr>
             <a:r>
-              <a:rPr lang="es-ES_tradnl" dirty="0" smtClean="0"/>
+              <a:rPr lang="es-ES_tradnl" dirty="0"/>
               <a:t>Filtrar los pedidos por estado.</a:t>
             </a:r>
           </a:p>
@@ -4310,7 +4484,7 @@
               <a:buChar char="•"/>
             </a:pPr>
             <a:r>
-              <a:rPr lang="es-ES_tradnl" dirty="0" smtClean="0"/>
+              <a:rPr lang="es-ES_tradnl" dirty="0"/>
               <a:t>Uso de un carrito de la compra para gestionar el pedido sin confirmar.</a:t>
             </a:r>
           </a:p>
@@ -4320,7 +4494,7 @@
               <a:buChar char="•"/>
             </a:pPr>
             <a:r>
-              <a:rPr lang="es-ES_tradnl" dirty="0" smtClean="0"/>
+              <a:rPr lang="es-ES_tradnl" dirty="0"/>
               <a:t>Escoger los productos que forman parte del escaparate.</a:t>
             </a:r>
           </a:p>
@@ -4330,7 +4504,7 @@
               <a:buChar char="•"/>
             </a:pPr>
             <a:r>
-              <a:rPr lang="es-ES_tradnl" dirty="0" smtClean="0"/>
+              <a:rPr lang="es-ES_tradnl" dirty="0"/>
               <a:t>Los pedidos podrán tener los siguientes estados:</a:t>
             </a:r>
           </a:p>
@@ -4340,7 +4514,7 @@
               <a:buChar char="•"/>
             </a:pPr>
             <a:r>
-              <a:rPr lang="es-ES_tradnl" dirty="0" smtClean="0"/>
+              <a:rPr lang="es-ES_tradnl" dirty="0"/>
               <a:t>Sin confirmar.</a:t>
             </a:r>
           </a:p>
@@ -4350,7 +4524,7 @@
               <a:buChar char="•"/>
             </a:pPr>
             <a:r>
-              <a:rPr lang="es-ES_tradnl" dirty="0" smtClean="0"/>
+              <a:rPr lang="es-ES_tradnl" dirty="0"/>
               <a:t>Confirmado.</a:t>
             </a:r>
           </a:p>
@@ -4360,7 +4534,7 @@
               <a:buChar char="•"/>
             </a:pPr>
             <a:r>
-              <a:rPr lang="es-ES_tradnl" dirty="0" smtClean="0"/>
+              <a:rPr lang="es-ES_tradnl" dirty="0"/>
               <a:t>Preparando.</a:t>
             </a:r>
           </a:p>
@@ -4370,7 +4544,7 @@
               <a:buChar char="•"/>
             </a:pPr>
             <a:r>
-              <a:rPr lang="es-ES_tradnl" dirty="0" smtClean="0"/>
+              <a:rPr lang="es-ES_tradnl" dirty="0"/>
               <a:t>Enviado.</a:t>
             </a:r>
           </a:p>
@@ -4380,7 +4554,7 @@
               <a:buChar char="•"/>
             </a:pPr>
             <a:r>
-              <a:rPr lang="es-ES_tradnl" dirty="0" smtClean="0"/>
+              <a:rPr lang="es-ES_tradnl" dirty="0"/>
               <a:t>Recibido.</a:t>
             </a:r>
           </a:p>
@@ -4390,10 +4564,9 @@
               <a:buChar char="•"/>
             </a:pPr>
             <a:r>
-              <a:rPr lang="es-ES_tradnl" dirty="0" smtClean="0"/>
+              <a:rPr lang="es-ES_tradnl" dirty="0"/>
               <a:t>Cobrado.</a:t>
             </a:r>
-            <a:endParaRPr lang="es-ES_tradnl" dirty="0"/>
           </a:p>
         </p:txBody>
       </p:sp>
@@ -4407,13 +4580,6 @@
   <p:clrMapOvr>
     <a:masterClrMapping/>
   </p:clrMapOvr>
-  <p:timing>
-    <p:tnLst>
-      <p:par>
-        <p:cTn id="1" dur="indefinite" restart="never" nodeType="tmRoot"/>
-      </p:par>
-    </p:tnLst>
-  </p:timing>
 </p:sld>
 </file>
 
@@ -4581,13 +4747,6 @@
   <p:clrMapOvr>
     <a:masterClrMapping/>
   </p:clrMapOvr>
-  <p:timing>
-    <p:tnLst>
-      <p:par>
-        <p:cTn id="1" dur="indefinite" restart="never" nodeType="tmRoot"/>
-      </p:par>
-    </p:tnLst>
-  </p:timing>
 </p:sld>
 </file>
 
@@ -4684,7 +4843,7 @@
                 <a14:useLocalDpi xmlns:a14="http://schemas.microsoft.com/office/drawing/2010/main" val="0"/>
               </a:ext>
               <a:ext uri="{96DAC541-7B7A-43D3-8B79-37D633B846F1}">
-                <asvg:svgBlip xmlns:asvg="http://schemas.microsoft.com/office/drawing/2016/SVG/main" xmlns="" r:embed="rId3"/>
+                <asvg:svgBlip xmlns:asvg="http://schemas.microsoft.com/office/drawing/2016/SVG/main" r:embed="rId3"/>
               </a:ext>
             </a:extLst>
           </a:blip>
@@ -4744,18 +4903,10 @@
                   <a:schemeClr val="bg1"/>
                 </a:solidFill>
               </a:rPr>
-              <a:t>más </a:t>
-            </a:r>
-            <a:r>
-              <a:rPr lang="es-ES" sz="3600" b="1" dirty="0" smtClean="0">
-                <a:solidFill>
-                  <a:schemeClr val="bg1"/>
-                </a:solidFill>
-              </a:rPr>
-              <a:t>relevantes</a:t>
-            </a:r>
-            <a:r>
-              <a:rPr lang="es-ES" sz="3600" dirty="0" smtClean="0">
+              <a:t>más relevantes</a:t>
+            </a:r>
+            <a:r>
+              <a:rPr lang="es-ES" sz="3600" dirty="0">
                 <a:solidFill>
                   <a:schemeClr val="bg1"/>
                 </a:solidFill>
@@ -4763,7 +4914,7 @@
               <a:t> (</a:t>
             </a:r>
             <a:r>
-              <a:rPr lang="es-ES" sz="3600" u="sng" dirty="0" smtClean="0">
+              <a:rPr lang="es-ES" sz="3600" u="sng" dirty="0">
                 <a:solidFill>
                   <a:schemeClr val="bg1"/>
                 </a:solidFill>
@@ -4771,7 +4922,7 @@
               <a:t>según la especificación previa</a:t>
             </a:r>
             <a:r>
-              <a:rPr lang="es-ES" sz="3600" dirty="0" smtClean="0">
+              <a:rPr lang="es-ES" sz="3600" dirty="0">
                 <a:solidFill>
                   <a:schemeClr val="bg1"/>
                 </a:solidFill>
@@ -4813,7 +4964,7 @@
               <a:buChar char="•"/>
             </a:pPr>
             <a:r>
-              <a:rPr lang="es-ES_tradnl" dirty="0" smtClean="0"/>
+              <a:rPr lang="es-ES_tradnl" dirty="0"/>
               <a:t>[Visitante]</a:t>
             </a:r>
           </a:p>
@@ -4823,10 +4974,10 @@
               <a:buChar char="•"/>
             </a:pPr>
             <a:r>
-              <a:rPr lang="es-ES_tradnl" u="sng" dirty="0" smtClean="0"/>
+              <a:rPr lang="es-ES_tradnl" u="sng" dirty="0"/>
               <a:t>Acceso a las páginas más generales, como por ejemplo: Inicio, Productos, Quiénes somos, Contacto, …</a:t>
             </a:r>
-            <a:endParaRPr lang="es-ES_tradnl" dirty="0" smtClean="0"/>
+            <a:endParaRPr lang="es-ES_tradnl" dirty="0"/>
           </a:p>
           <a:p>
             <a:pPr marL="742950" lvl="1" indent="-285750">
@@ -4834,7 +4985,7 @@
               <a:buChar char="•"/>
             </a:pPr>
             <a:r>
-              <a:rPr lang="es-ES_tradnl" dirty="0" smtClean="0"/>
+              <a:rPr lang="es-ES_tradnl" dirty="0"/>
               <a:t>Crear una cuenta de usuario.</a:t>
             </a:r>
           </a:p>
@@ -4844,7 +4995,7 @@
               <a:buChar char="•"/>
             </a:pPr>
             <a:r>
-              <a:rPr lang="es-ES_tradnl" dirty="0" smtClean="0"/>
+              <a:rPr lang="es-ES_tradnl" dirty="0"/>
               <a:t>Iniciar sesión.</a:t>
             </a:r>
           </a:p>
@@ -4854,7 +5005,7 @@
               <a:buChar char="•"/>
             </a:pPr>
             <a:r>
-              <a:rPr lang="es-ES_tradnl" b="1" dirty="0" smtClean="0"/>
+              <a:rPr lang="es-ES_tradnl" b="1" dirty="0"/>
               <a:t>Usuario</a:t>
             </a:r>
           </a:p>
@@ -4864,7 +5015,7 @@
               <a:buChar char="•"/>
             </a:pPr>
             <a:r>
-              <a:rPr lang="es-ES_tradnl" u="sng" dirty="0" smtClean="0"/>
+              <a:rPr lang="es-ES_tradnl" u="sng" dirty="0"/>
               <a:t>Acceso a las páginas más generales, como por ejemplo: Inicio, Productos, Quiénes somos, Contacto, …</a:t>
             </a:r>
           </a:p>
@@ -4874,7 +5025,7 @@
               <a:buChar char="•"/>
             </a:pPr>
             <a:r>
-              <a:rPr lang="es-ES_tradnl" dirty="0" smtClean="0"/>
+              <a:rPr lang="es-ES_tradnl" dirty="0"/>
               <a:t>Modificar su contraseña.</a:t>
             </a:r>
           </a:p>
@@ -4884,7 +5035,7 @@
               <a:buChar char="•"/>
             </a:pPr>
             <a:r>
-              <a:rPr lang="es-ES_tradnl" dirty="0" smtClean="0"/>
+              <a:rPr lang="es-ES_tradnl" dirty="0"/>
               <a:t>Introducir su información personal (se convertiría en cliente).</a:t>
             </a:r>
           </a:p>
@@ -4894,19 +5045,19 @@
               <a:buChar char="•"/>
             </a:pPr>
             <a:r>
-              <a:rPr lang="es-ES_tradnl" b="1" dirty="0" smtClean="0"/>
+              <a:rPr lang="es-ES_tradnl" b="1" dirty="0"/>
               <a:t>Cliente </a:t>
             </a:r>
             <a:r>
-              <a:rPr lang="es-ES_tradnl" dirty="0" smtClean="0"/>
+              <a:rPr lang="es-ES_tradnl" dirty="0"/>
               <a:t>(es un </a:t>
             </a:r>
             <a:r>
-              <a:rPr lang="es-ES_tradnl" u="sng" dirty="0" smtClean="0"/>
+              <a:rPr lang="es-ES_tradnl" u="sng" dirty="0"/>
               <a:t>usuario</a:t>
             </a:r>
             <a:r>
-              <a:rPr lang="es-ES_tradnl" dirty="0" smtClean="0"/>
+              <a:rPr lang="es-ES_tradnl" dirty="0"/>
               <a:t> con su información personal)</a:t>
             </a:r>
           </a:p>
@@ -4926,7 +5077,7 @@
               <a:buChar char="•"/>
             </a:pPr>
             <a:r>
-              <a:rPr lang="es-ES_tradnl" dirty="0" smtClean="0"/>
+              <a:rPr lang="es-ES_tradnl" dirty="0"/>
               <a:t>Modificar su contraseña.</a:t>
             </a:r>
           </a:p>
@@ -4936,7 +5087,7 @@
               <a:buChar char="•"/>
             </a:pPr>
             <a:r>
-              <a:rPr lang="es-ES_tradnl" dirty="0" smtClean="0"/>
+              <a:rPr lang="es-ES_tradnl" dirty="0"/>
               <a:t>Actualizar su información personal.</a:t>
             </a:r>
           </a:p>
@@ -4946,7 +5097,7 @@
               <a:buChar char="•"/>
             </a:pPr>
             <a:r>
-              <a:rPr lang="es-ES_tradnl" dirty="0" smtClean="0"/>
+              <a:rPr lang="es-ES_tradnl" dirty="0"/>
               <a:t>Posibilidad de listar y ver sus pedidos ya confirmados (también puede filtrarlos por el estado).</a:t>
             </a:r>
           </a:p>
@@ -4956,7 +5107,7 @@
               <a:buChar char="•"/>
             </a:pPr>
             <a:r>
-              <a:rPr lang="es-ES_tradnl" dirty="0" smtClean="0"/>
+              <a:rPr lang="es-ES_tradnl" dirty="0"/>
               <a:t>Consultar el estado de sus pedidos ya confirmados.</a:t>
             </a:r>
           </a:p>
@@ -4966,7 +5117,7 @@
               <a:buChar char="•"/>
             </a:pPr>
             <a:r>
-              <a:rPr lang="es-ES_tradnl" dirty="0" smtClean="0"/>
+              <a:rPr lang="es-ES_tradnl" dirty="0"/>
               <a:t>Gestionar su carrito de la compra (eliminar detalles, vaciar el carrito, confirmarlo, …).</a:t>
             </a:r>
           </a:p>
@@ -4976,7 +5127,7 @@
               <a:buChar char="•"/>
             </a:pPr>
             <a:r>
-              <a:rPr lang="es-ES_tradnl" b="1" dirty="0" smtClean="0"/>
+              <a:rPr lang="es-ES_tradnl" b="1" dirty="0"/>
               <a:t>Administrador</a:t>
             </a:r>
           </a:p>
@@ -4986,7 +5137,7 @@
               <a:buChar char="•"/>
             </a:pPr>
             <a:r>
-              <a:rPr lang="es-ES_tradnl" dirty="0" smtClean="0"/>
+              <a:rPr lang="es-ES_tradnl" dirty="0"/>
               <a:t>Gestionar la información personal de los clientes.</a:t>
             </a:r>
           </a:p>
@@ -4996,10 +5147,9 @@
               <a:buChar char="•"/>
             </a:pPr>
             <a:r>
-              <a:rPr lang="es-ES_tradnl" dirty="0" smtClean="0"/>
+              <a:rPr lang="es-ES_tradnl" dirty="0"/>
               <a:t>Gestionar los productos, categorías, estados de los pedidos y los datos de los clientes.</a:t>
             </a:r>
-            <a:endParaRPr lang="es-ES_tradnl" dirty="0"/>
           </a:p>
         </p:txBody>
       </p:sp>
@@ -5013,13 +5163,6 @@
   <p:clrMapOvr>
     <a:masterClrMapping/>
   </p:clrMapOvr>
-  <p:timing>
-    <p:tnLst>
-      <p:par>
-        <p:cTn id="1" dur="indefinite" restart="never" nodeType="tmRoot"/>
-      </p:par>
-    </p:tnLst>
-  </p:timing>
 </p:sld>
 </file>
 
@@ -5187,13 +5330,6 @@
   <p:clrMapOvr>
     <a:masterClrMapping/>
   </p:clrMapOvr>
-  <p:timing>
-    <p:tnLst>
-      <p:par>
-        <p:cTn id="1" dur="indefinite" restart="never" nodeType="tmRoot"/>
-      </p:par>
-    </p:tnLst>
-  </p:timing>
 </p:sld>
 </file>
 
@@ -5236,7 +5372,7 @@
                 <a14:useLocalDpi xmlns:a14="http://schemas.microsoft.com/office/drawing/2010/main" val="0"/>
               </a:ext>
               <a:ext uri="{96DAC541-7B7A-43D3-8B79-37D633B846F1}">
-                <asvg:svgBlip xmlns:asvg="http://schemas.microsoft.com/office/drawing/2016/SVG/main" xmlns="" r:embed="rId3"/>
+                <asvg:svgBlip xmlns:asvg="http://schemas.microsoft.com/office/drawing/2016/SVG/main" r:embed="rId3"/>
               </a:ext>
             </a:extLst>
           </a:blip>
@@ -5304,7 +5440,7 @@
                 <a14:useLocalDpi xmlns:a14="http://schemas.microsoft.com/office/drawing/2010/main" val="0"/>
               </a:ext>
               <a:ext uri="{96DAC541-7B7A-43D3-8B79-37D633B846F1}">
-                <asvg:svgBlip xmlns:asvg="http://schemas.microsoft.com/office/drawing/2016/SVG/main" xmlns="" r:embed="rId5"/>
+                <asvg:svgBlip xmlns:asvg="http://schemas.microsoft.com/office/drawing/2016/SVG/main" r:embed="rId5"/>
               </a:ext>
             </a:extLst>
           </a:blip>
@@ -5332,13 +5468,6 @@
   <p:clrMapOvr>
     <a:masterClrMapping/>
   </p:clrMapOvr>
-  <p:timing>
-    <p:tnLst>
-      <p:par>
-        <p:cTn id="1" dur="indefinite" restart="never" nodeType="tmRoot"/>
-      </p:par>
-    </p:tnLst>
-  </p:timing>
 </p:sld>
 </file>
 

</xml_diff>

<commit_message>
Redacción de la memoria y mejoro el acceso de añadir metas.
</commit_message>
<xml_diff>
--- a/Camera.Shop.pptx
+++ b/Camera.Shop.pptx
@@ -265,7 +265,7 @@
           <a:p>
             <a:fld id="{1C0CA69E-655A-411A-BFB7-3B2417C08202}" type="datetimeFigureOut">
               <a:rPr lang="es-ES" smtClean="0"/>
-              <a:t>18/02/2019</a:t>
+              <a:t>19/02/2019</a:t>
             </a:fld>
             <a:endParaRPr lang="es-ES"/>
           </a:p>
@@ -463,7 +463,7 @@
           <a:p>
             <a:fld id="{1C0CA69E-655A-411A-BFB7-3B2417C08202}" type="datetimeFigureOut">
               <a:rPr lang="es-ES" smtClean="0"/>
-              <a:t>18/02/2019</a:t>
+              <a:t>19/02/2019</a:t>
             </a:fld>
             <a:endParaRPr lang="es-ES"/>
           </a:p>
@@ -671,7 +671,7 @@
           <a:p>
             <a:fld id="{1C0CA69E-655A-411A-BFB7-3B2417C08202}" type="datetimeFigureOut">
               <a:rPr lang="es-ES" smtClean="0"/>
-              <a:t>18/02/2019</a:t>
+              <a:t>19/02/2019</a:t>
             </a:fld>
             <a:endParaRPr lang="es-ES"/>
           </a:p>
@@ -869,7 +869,7 @@
           <a:p>
             <a:fld id="{1C0CA69E-655A-411A-BFB7-3B2417C08202}" type="datetimeFigureOut">
               <a:rPr lang="es-ES" smtClean="0"/>
-              <a:t>18/02/2019</a:t>
+              <a:t>19/02/2019</a:t>
             </a:fld>
             <a:endParaRPr lang="es-ES"/>
           </a:p>
@@ -1144,7 +1144,7 @@
           <a:p>
             <a:fld id="{1C0CA69E-655A-411A-BFB7-3B2417C08202}" type="datetimeFigureOut">
               <a:rPr lang="es-ES" smtClean="0"/>
-              <a:t>18/02/2019</a:t>
+              <a:t>19/02/2019</a:t>
             </a:fld>
             <a:endParaRPr lang="es-ES"/>
           </a:p>
@@ -1409,7 +1409,7 @@
           <a:p>
             <a:fld id="{1C0CA69E-655A-411A-BFB7-3B2417C08202}" type="datetimeFigureOut">
               <a:rPr lang="es-ES" smtClean="0"/>
-              <a:t>18/02/2019</a:t>
+              <a:t>19/02/2019</a:t>
             </a:fld>
             <a:endParaRPr lang="es-ES"/>
           </a:p>
@@ -1821,7 +1821,7 @@
           <a:p>
             <a:fld id="{1C0CA69E-655A-411A-BFB7-3B2417C08202}" type="datetimeFigureOut">
               <a:rPr lang="es-ES" smtClean="0"/>
-              <a:t>18/02/2019</a:t>
+              <a:t>19/02/2019</a:t>
             </a:fld>
             <a:endParaRPr lang="es-ES"/>
           </a:p>
@@ -1962,7 +1962,7 @@
           <a:p>
             <a:fld id="{1C0CA69E-655A-411A-BFB7-3B2417C08202}" type="datetimeFigureOut">
               <a:rPr lang="es-ES" smtClean="0"/>
-              <a:t>18/02/2019</a:t>
+              <a:t>19/02/2019</a:t>
             </a:fld>
             <a:endParaRPr lang="es-ES"/>
           </a:p>
@@ -2075,7 +2075,7 @@
           <a:p>
             <a:fld id="{1C0CA69E-655A-411A-BFB7-3B2417C08202}" type="datetimeFigureOut">
               <a:rPr lang="es-ES" smtClean="0"/>
-              <a:t>18/02/2019</a:t>
+              <a:t>19/02/2019</a:t>
             </a:fld>
             <a:endParaRPr lang="es-ES"/>
           </a:p>
@@ -2386,7 +2386,7 @@
           <a:p>
             <a:fld id="{1C0CA69E-655A-411A-BFB7-3B2417C08202}" type="datetimeFigureOut">
               <a:rPr lang="es-ES" smtClean="0"/>
-              <a:t>18/02/2019</a:t>
+              <a:t>19/02/2019</a:t>
             </a:fld>
             <a:endParaRPr lang="es-ES"/>
           </a:p>
@@ -2674,7 +2674,7 @@
           <a:p>
             <a:fld id="{1C0CA69E-655A-411A-BFB7-3B2417C08202}" type="datetimeFigureOut">
               <a:rPr lang="es-ES" smtClean="0"/>
-              <a:t>18/02/2019</a:t>
+              <a:t>19/02/2019</a:t>
             </a:fld>
             <a:endParaRPr lang="es-ES"/>
           </a:p>
@@ -2915,7 +2915,7 @@
           <a:p>
             <a:fld id="{1C0CA69E-655A-411A-BFB7-3B2417C08202}" type="datetimeFigureOut">
               <a:rPr lang="es-ES" smtClean="0"/>
-              <a:t>18/02/2019</a:t>
+              <a:t>19/02/2019</a:t>
             </a:fld>
             <a:endParaRPr lang="es-ES"/>
           </a:p>
@@ -3514,7 +3514,7 @@
                 <a14:useLocalDpi xmlns:a14="http://schemas.microsoft.com/office/drawing/2010/main" val="0"/>
               </a:ext>
               <a:ext uri="{96DAC541-7B7A-43D3-8B79-37D633B846F1}">
-                <asvg:svgBlip xmlns:asvg="http://schemas.microsoft.com/office/drawing/2016/SVG/main" r:embed="rId3"/>
+                <asvg:svgBlip xmlns:asvg="http://schemas.microsoft.com/office/drawing/2016/SVG/main" xmlns="" r:embed="rId3"/>
               </a:ext>
             </a:extLst>
           </a:blip>
@@ -3963,7 +3963,7 @@
                 <a14:useLocalDpi xmlns:a14="http://schemas.microsoft.com/office/drawing/2010/main" val="0"/>
               </a:ext>
               <a:ext uri="{96DAC541-7B7A-43D3-8B79-37D633B846F1}">
-                <asvg:svgBlip xmlns:asvg="http://schemas.microsoft.com/office/drawing/2016/SVG/main" r:embed="rId3"/>
+                <asvg:svgBlip xmlns:asvg="http://schemas.microsoft.com/office/drawing/2016/SVG/main" xmlns="" r:embed="rId3"/>
               </a:ext>
             </a:extLst>
           </a:blip>
@@ -4350,7 +4350,7 @@
                 <a14:useLocalDpi xmlns:a14="http://schemas.microsoft.com/office/drawing/2010/main" val="0"/>
               </a:ext>
               <a:ext uri="{96DAC541-7B7A-43D3-8B79-37D633B846F1}">
-                <asvg:svgBlip xmlns:asvg="http://schemas.microsoft.com/office/drawing/2016/SVG/main" r:embed="rId3"/>
+                <asvg:svgBlip xmlns:asvg="http://schemas.microsoft.com/office/drawing/2016/SVG/main" xmlns="" r:embed="rId3"/>
               </a:ext>
             </a:extLst>
           </a:blip>
@@ -4843,7 +4843,7 @@
                 <a14:useLocalDpi xmlns:a14="http://schemas.microsoft.com/office/drawing/2010/main" val="0"/>
               </a:ext>
               <a:ext uri="{96DAC541-7B7A-43D3-8B79-37D633B846F1}">
-                <asvg:svgBlip xmlns:asvg="http://schemas.microsoft.com/office/drawing/2016/SVG/main" r:embed="rId3"/>
+                <asvg:svgBlip xmlns:asvg="http://schemas.microsoft.com/office/drawing/2016/SVG/main" xmlns="" r:embed="rId3"/>
               </a:ext>
             </a:extLst>
           </a:blip>
@@ -4945,8 +4945,8 @@
         </p:nvSpPr>
         <p:spPr>
           <a:xfrm>
-            <a:off x="358588" y="1372093"/>
-            <a:ext cx="11456894" cy="5078313"/>
+            <a:off x="358588" y="1155964"/>
+            <a:ext cx="11456894" cy="5632311"/>
           </a:xfrm>
           <a:prstGeom prst="rect">
             <a:avLst/>
@@ -5127,7 +5127,7 @@
               <a:buChar char="•"/>
             </a:pPr>
             <a:r>
-              <a:rPr lang="es-ES_tradnl" b="1" dirty="0"/>
+              <a:rPr lang="es-ES_tradnl" b="1" dirty="0" smtClean="0"/>
               <a:t>Administrador</a:t>
             </a:r>
           </a:p>
@@ -5137,8 +5137,32 @@
               <a:buChar char="•"/>
             </a:pPr>
             <a:r>
+              <a:rPr lang="es-ES_tradnl" u="sng" dirty="0"/>
+              <a:t>Acceso a las páginas más generales, como por ejemplo: Inicio, Productos, Quiénes somos, Contacto, …</a:t>
+            </a:r>
+          </a:p>
+          <a:p>
+            <a:pPr marL="742950" lvl="1" indent="-285750">
+              <a:buFont typeface="Arial" panose="020B0604020202020204" pitchFamily="34" charset="0"/>
+              <a:buChar char="•"/>
+            </a:pPr>
+            <a:r>
+              <a:rPr lang="es-ES_tradnl" dirty="0" smtClean="0"/>
+              <a:t>Modificar su contraseña.</a:t>
+            </a:r>
+          </a:p>
+          <a:p>
+            <a:pPr marL="742950" lvl="1" indent="-285750">
+              <a:buFont typeface="Arial" panose="020B0604020202020204" pitchFamily="34" charset="0"/>
+              <a:buChar char="•"/>
+            </a:pPr>
+            <a:r>
+              <a:rPr lang="es-ES_tradnl" dirty="0" smtClean="0"/>
+              <a:t>Gestionar </a:t>
+            </a:r>
+            <a:r>
               <a:rPr lang="es-ES_tradnl" dirty="0"/>
-              <a:t>Gestionar la información personal de los clientes.</a:t>
+              <a:t>la información personal de los clientes.</a:t>
             </a:r>
           </a:p>
           <a:p>
@@ -5372,7 +5396,7 @@
                 <a14:useLocalDpi xmlns:a14="http://schemas.microsoft.com/office/drawing/2010/main" val="0"/>
               </a:ext>
               <a:ext uri="{96DAC541-7B7A-43D3-8B79-37D633B846F1}">
-                <asvg:svgBlip xmlns:asvg="http://schemas.microsoft.com/office/drawing/2016/SVG/main" r:embed="rId3"/>
+                <asvg:svgBlip xmlns:asvg="http://schemas.microsoft.com/office/drawing/2016/SVG/main" xmlns="" r:embed="rId3"/>
               </a:ext>
             </a:extLst>
           </a:blip>
@@ -5440,7 +5464,7 @@
                 <a14:useLocalDpi xmlns:a14="http://schemas.microsoft.com/office/drawing/2010/main" val="0"/>
               </a:ext>
               <a:ext uri="{96DAC541-7B7A-43D3-8B79-37D633B846F1}">
-                <asvg:svgBlip xmlns:asvg="http://schemas.microsoft.com/office/drawing/2016/SVG/main" r:embed="rId5"/>
+                <asvg:svgBlip xmlns:asvg="http://schemas.microsoft.com/office/drawing/2016/SVG/main" xmlns="" r:embed="rId5"/>
               </a:ext>
             </a:extLst>
           </a:blip>

</xml_diff>

<commit_message>
Cambio del orden de las diapositivas.
</commit_message>
<xml_diff>
--- a/Camera.Shop.pptx
+++ b/Camera.Shop.pptx
@@ -6,10 +6,10 @@
   </p:sldMasterIdLst>
   <p:sldIdLst>
     <p:sldId id="256" r:id="rId2"/>
-    <p:sldId id="263" r:id="rId3"/>
+    <p:sldId id="260" r:id="rId3"/>
     <p:sldId id="262" r:id="rId4"/>
-    <p:sldId id="257" r:id="rId5"/>
-    <p:sldId id="260" r:id="rId6"/>
+    <p:sldId id="263" r:id="rId5"/>
+    <p:sldId id="257" r:id="rId6"/>
     <p:sldId id="259" r:id="rId7"/>
     <p:sldId id="264" r:id="rId8"/>
   </p:sldIdLst>
@@ -3514,7 +3514,7 @@
                 <a14:useLocalDpi xmlns:a14="http://schemas.microsoft.com/office/drawing/2010/main" val="0"/>
               </a:ext>
               <a:ext uri="{96DAC541-7B7A-43D3-8B79-37D633B846F1}">
-                <asvg:svgBlip xmlns:asvg="http://schemas.microsoft.com/office/drawing/2016/SVG/main" xmlns="" r:embed="rId3"/>
+                <asvg:svgBlip xmlns="" xmlns:asvg="http://schemas.microsoft.com/office/drawing/2016/SVG/main" r:embed="rId3"/>
               </a:ext>
             </a:extLst>
           </a:blip>
@@ -3963,7 +3963,7 @@
                 <a14:useLocalDpi xmlns:a14="http://schemas.microsoft.com/office/drawing/2010/main" val="0"/>
               </a:ext>
               <a:ext uri="{96DAC541-7B7A-43D3-8B79-37D633B846F1}">
-                <asvg:svgBlip xmlns:asvg="http://schemas.microsoft.com/office/drawing/2016/SVG/main" xmlns="" r:embed="rId3"/>
+                <asvg:svgBlip xmlns="" xmlns:asvg="http://schemas.microsoft.com/office/drawing/2016/SVG/main" r:embed="rId3"/>
               </a:ext>
             </a:extLst>
           </a:blip>
@@ -4000,7 +4000,7 @@
         <p:spPr>
           <a:xfrm>
             <a:off x="257288" y="86061"/>
-            <a:ext cx="10515600" cy="960382"/>
+            <a:ext cx="11654850" cy="960382"/>
           </a:xfrm>
         </p:spPr>
         <p:txBody>
@@ -4015,8 +4015,45 @@
                   <a:schemeClr val="bg1"/>
                 </a:solidFill>
               </a:rPr>
-              <a:t>Tecnologías utilizadas</a:t>
-            </a:r>
+              <a:t>Casos de uso </a:t>
+            </a:r>
+            <a:r>
+              <a:rPr lang="es-ES" sz="3600" b="1" dirty="0">
+                <a:solidFill>
+                  <a:schemeClr val="bg1"/>
+                </a:solidFill>
+              </a:rPr>
+              <a:t>más relevantes</a:t>
+            </a:r>
+            <a:r>
+              <a:rPr lang="es-ES" sz="3600" dirty="0">
+                <a:solidFill>
+                  <a:schemeClr val="bg1"/>
+                </a:solidFill>
+              </a:rPr>
+              <a:t> (</a:t>
+            </a:r>
+            <a:r>
+              <a:rPr lang="es-ES" sz="3600" u="sng" dirty="0">
+                <a:solidFill>
+                  <a:schemeClr val="bg1"/>
+                </a:solidFill>
+              </a:rPr>
+              <a:t>según la especificación previa</a:t>
+            </a:r>
+            <a:r>
+              <a:rPr lang="es-ES" sz="3600" dirty="0">
+                <a:solidFill>
+                  <a:schemeClr val="bg1"/>
+                </a:solidFill>
+              </a:rPr>
+              <a:t>)</a:t>
+            </a:r>
+            <a:endParaRPr lang="es-ES" sz="3600" b="1" dirty="0">
+              <a:solidFill>
+                <a:schemeClr val="bg1"/>
+              </a:solidFill>
+            </a:endParaRPr>
           </a:p>
         </p:txBody>
       </p:sp>
@@ -4028,8 +4065,8 @@
         </p:nvSpPr>
         <p:spPr>
           <a:xfrm>
-            <a:off x="597735" y="1306216"/>
-            <a:ext cx="11092441" cy="3139321"/>
+            <a:off x="358588" y="1155964"/>
+            <a:ext cx="11456894" cy="5632311"/>
           </a:xfrm>
           <a:prstGeom prst="rect">
             <a:avLst/>
@@ -4048,11 +4085,7 @@
             </a:pPr>
             <a:r>
               <a:rPr lang="es-ES_tradnl" dirty="0"/>
-              <a:t>Aplicación web </a:t>
-            </a:r>
-            <a:r>
-              <a:rPr lang="es-ES_tradnl" b="1" dirty="0"/>
-              <a:t>ASP.NET</a:t>
+              <a:t>[Visitante]</a:t>
             </a:r>
           </a:p>
           <a:p>
@@ -4061,33 +4094,10 @@
               <a:buChar char="•"/>
             </a:pPr>
             <a:r>
-              <a:rPr lang="es-ES_tradnl" dirty="0"/>
-              <a:t>Técnica de </a:t>
-            </a:r>
-            <a:r>
-              <a:rPr lang="es-ES_tradnl" b="1" dirty="0" err="1"/>
-              <a:t>Database</a:t>
-            </a:r>
-            <a:r>
-              <a:rPr lang="es-ES_tradnl" b="1" dirty="0"/>
-              <a:t> </a:t>
-            </a:r>
-            <a:r>
-              <a:rPr lang="es-ES_tradnl" dirty="0" err="1"/>
-              <a:t>First</a:t>
+              <a:rPr lang="es-ES_tradnl" u="sng" dirty="0"/>
+              <a:t>Acceso a las páginas más generales, como por ejemplo: Inicio, Productos, Quiénes somos, Contacto, …</a:t>
             </a:r>
             <a:endParaRPr lang="es-ES_tradnl" dirty="0"/>
-          </a:p>
-          <a:p>
-            <a:pPr marL="1200150" lvl="2" indent="-285750">
-              <a:buFont typeface="Arial" panose="020B0604020202020204" pitchFamily="34" charset="0"/>
-              <a:buChar char="•"/>
-            </a:pPr>
-            <a:r>
-              <a:rPr lang="es-ES_tradnl" dirty="0"/>
-              <a:t>Se crea en primer lugar el modelo relacional.</a:t>
-            </a:r>
-            <a:endParaRPr lang="es-ES_tradnl" b="1" dirty="0"/>
           </a:p>
           <a:p>
             <a:pPr marL="742950" lvl="1" indent="-285750">
@@ -4096,34 +4106,7 @@
             </a:pPr>
             <a:r>
               <a:rPr lang="es-ES_tradnl" dirty="0"/>
-              <a:t>Se mapea la de base de datos con </a:t>
-            </a:r>
-            <a:r>
-              <a:rPr lang="es-ES_tradnl" b="1" dirty="0"/>
-              <a:t>ADO.NET </a:t>
-            </a:r>
-            <a:r>
-              <a:rPr lang="es-ES_tradnl" b="1" dirty="0" err="1"/>
-              <a:t>Entity</a:t>
-            </a:r>
-            <a:r>
-              <a:rPr lang="es-ES_tradnl" b="1" dirty="0"/>
-              <a:t> Data </a:t>
-            </a:r>
-            <a:r>
-              <a:rPr lang="es-ES_tradnl" b="1" dirty="0" err="1"/>
-              <a:t>Model</a:t>
-            </a:r>
-            <a:endParaRPr lang="es-ES_tradnl" b="1" dirty="0"/>
-          </a:p>
-          <a:p>
-            <a:pPr marL="1200150" lvl="2" indent="-285750">
-              <a:buFont typeface="Arial" panose="020B0604020202020204" pitchFamily="34" charset="0"/>
-              <a:buChar char="•"/>
-            </a:pPr>
-            <a:r>
-              <a:rPr lang="es-ES_tradnl" dirty="0"/>
-              <a:t>Se genera la entidad de modelo de datos de forma automatizada a partir de la base de datos del proyecto.</a:t>
+              <a:t>Crear una cuenta de usuario.</a:t>
             </a:r>
           </a:p>
           <a:p>
@@ -4133,59 +4116,17 @@
             </a:pPr>
             <a:r>
               <a:rPr lang="es-ES_tradnl" dirty="0"/>
-              <a:t>Acceso a los datos mediante </a:t>
-            </a:r>
+              <a:t>Iniciar sesión.</a:t>
+            </a:r>
+          </a:p>
+          <a:p>
+            <a:pPr marL="285750" indent="-285750">
+              <a:buFont typeface="Arial" panose="020B0604020202020204" pitchFamily="34" charset="0"/>
+              <a:buChar char="•"/>
+            </a:pPr>
             <a:r>
               <a:rPr lang="es-ES_tradnl" b="1" dirty="0"/>
-              <a:t>LINQ </a:t>
-            </a:r>
-            <a:r>
-              <a:rPr lang="es-ES_tradnl" dirty="0"/>
-              <a:t>(</a:t>
-            </a:r>
-            <a:r>
-              <a:rPr lang="es-ES_tradnl" dirty="0" err="1"/>
-              <a:t>Language</a:t>
-            </a:r>
-            <a:r>
-              <a:rPr lang="es-ES_tradnl" dirty="0"/>
-              <a:t> </a:t>
-            </a:r>
-            <a:r>
-              <a:rPr lang="es-ES_tradnl" dirty="0" err="1"/>
-              <a:t>Integrated</a:t>
-            </a:r>
-            <a:r>
-              <a:rPr lang="es-ES_tradnl" dirty="0"/>
-              <a:t> </a:t>
-            </a:r>
-            <a:r>
-              <a:rPr lang="es-ES_tradnl" dirty="0" err="1"/>
-              <a:t>Query</a:t>
-            </a:r>
-            <a:r>
-              <a:rPr lang="es-ES_tradnl" dirty="0"/>
-              <a:t>) </a:t>
-            </a:r>
-            <a:r>
-              <a:rPr lang="es-ES_tradnl" b="1" dirty="0" err="1"/>
-              <a:t>to</a:t>
-            </a:r>
-            <a:r>
-              <a:rPr lang="es-ES_tradnl" b="1" dirty="0"/>
-              <a:t> </a:t>
-            </a:r>
-            <a:r>
-              <a:rPr lang="es-ES_tradnl" b="1" dirty="0" err="1"/>
-              <a:t>Entities</a:t>
-            </a:r>
-            <a:r>
-              <a:rPr lang="es-ES_tradnl" b="1" dirty="0"/>
-              <a:t> </a:t>
-            </a:r>
-            <a:r>
-              <a:rPr lang="es-ES_tradnl" dirty="0"/>
-              <a:t>con consultas basadas en métodos con expresiones lambda.</a:t>
+              <a:t>Usuario</a:t>
             </a:r>
           </a:p>
           <a:p>
@@ -4194,52 +4135,164 @@
               <a:buChar char="•"/>
             </a:pPr>
             <a:r>
-              <a:rPr lang="es-ES_tradnl" dirty="0"/>
-              <a:t>Patrón </a:t>
-            </a:r>
-            <a:r>
-              <a:rPr lang="es-ES_tradnl" b="1" dirty="0"/>
-              <a:t>MVC</a:t>
-            </a:r>
-            <a:r>
-              <a:rPr lang="es-ES_tradnl" dirty="0"/>
-              <a:t> (Modelo - Vista - Controlador)</a:t>
-            </a:r>
-          </a:p>
-          <a:p>
-            <a:pPr marL="1200150" lvl="2" indent="-285750">
+              <a:rPr lang="es-ES_tradnl" u="sng" dirty="0"/>
+              <a:t>Acceso a las páginas más generales, como por ejemplo: Inicio, Productos, Quiénes somos, Contacto, …</a:t>
+            </a:r>
+          </a:p>
+          <a:p>
+            <a:pPr marL="742950" lvl="1" indent="-285750">
               <a:buFont typeface="Arial" panose="020B0604020202020204" pitchFamily="34" charset="0"/>
               <a:buChar char="•"/>
             </a:pPr>
             <a:r>
-              <a:rPr lang="es-ES_tradnl" u="sng" dirty="0"/>
-              <a:t>Vistas</a:t>
-            </a:r>
-          </a:p>
-          <a:p>
-            <a:pPr marL="1657350" lvl="3" indent="-285750">
+              <a:rPr lang="es-ES_tradnl" dirty="0"/>
+              <a:t>Modificar su contraseña.</a:t>
+            </a:r>
+          </a:p>
+          <a:p>
+            <a:pPr marL="742950" lvl="1" indent="-285750">
               <a:buFont typeface="Arial" panose="020B0604020202020204" pitchFamily="34" charset="0"/>
               <a:buChar char="•"/>
             </a:pPr>
             <a:r>
               <a:rPr lang="es-ES_tradnl" dirty="0"/>
-              <a:t>Uso del lenguaje o motor de vistas </a:t>
-            </a:r>
-            <a:r>
-              <a:rPr lang="es-ES_tradnl" b="1" dirty="0" err="1"/>
-              <a:t>Razor</a:t>
+              <a:t>Introducir su información personal (se convertiría en cliente).</a:t>
+            </a:r>
+          </a:p>
+          <a:p>
+            <a:pPr marL="285750" indent="-285750">
+              <a:buFont typeface="Arial" panose="020B0604020202020204" pitchFamily="34" charset="0"/>
+              <a:buChar char="•"/>
+            </a:pPr>
+            <a:r>
+              <a:rPr lang="es-ES_tradnl" b="1" dirty="0"/>
+              <a:t>Cliente </a:t>
             </a:r>
             <a:r>
               <a:rPr lang="es-ES_tradnl" dirty="0"/>
-              <a:t> (basado en </a:t>
-            </a:r>
-            <a:r>
-              <a:rPr lang="es-ES_tradnl" b="1" dirty="0"/>
-              <a:t>C#</a:t>
+              <a:t>(es un </a:t>
+            </a:r>
+            <a:r>
+              <a:rPr lang="es-ES_tradnl" u="sng" dirty="0"/>
+              <a:t>usuario</a:t>
             </a:r>
             <a:r>
               <a:rPr lang="es-ES_tradnl" dirty="0"/>
-              <a:t>).</a:t>
+              <a:t> con su información personal)</a:t>
+            </a:r>
+          </a:p>
+          <a:p>
+            <a:pPr marL="742950" lvl="1" indent="-285750">
+              <a:buFont typeface="Arial" panose="020B0604020202020204" pitchFamily="34" charset="0"/>
+              <a:buChar char="•"/>
+            </a:pPr>
+            <a:r>
+              <a:rPr lang="es-ES_tradnl" u="sng" dirty="0"/>
+              <a:t>Acceso a las páginas más generales, como por ejemplo: Inicio, Productos, Quiénes somos, Contacto, …</a:t>
+            </a:r>
+          </a:p>
+          <a:p>
+            <a:pPr marL="742950" lvl="1" indent="-285750">
+              <a:buFont typeface="Arial" panose="020B0604020202020204" pitchFamily="34" charset="0"/>
+              <a:buChar char="•"/>
+            </a:pPr>
+            <a:r>
+              <a:rPr lang="es-ES_tradnl" dirty="0"/>
+              <a:t>Modificar su contraseña.</a:t>
+            </a:r>
+          </a:p>
+          <a:p>
+            <a:pPr marL="742950" lvl="1" indent="-285750">
+              <a:buFont typeface="Arial" panose="020B0604020202020204" pitchFamily="34" charset="0"/>
+              <a:buChar char="•"/>
+            </a:pPr>
+            <a:r>
+              <a:rPr lang="es-ES_tradnl" dirty="0"/>
+              <a:t>Actualizar su información personal.</a:t>
+            </a:r>
+          </a:p>
+          <a:p>
+            <a:pPr marL="742950" lvl="1" indent="-285750">
+              <a:buFont typeface="Arial" panose="020B0604020202020204" pitchFamily="34" charset="0"/>
+              <a:buChar char="•"/>
+            </a:pPr>
+            <a:r>
+              <a:rPr lang="es-ES_tradnl" dirty="0"/>
+              <a:t>Posibilidad de listar y ver sus pedidos ya confirmados (también puede filtrarlos por el estado).</a:t>
+            </a:r>
+          </a:p>
+          <a:p>
+            <a:pPr marL="742950" lvl="1" indent="-285750">
+              <a:buFont typeface="Arial" panose="020B0604020202020204" pitchFamily="34" charset="0"/>
+              <a:buChar char="•"/>
+            </a:pPr>
+            <a:r>
+              <a:rPr lang="es-ES_tradnl" dirty="0"/>
+              <a:t>Consultar el estado de sus pedidos ya confirmados.</a:t>
+            </a:r>
+          </a:p>
+          <a:p>
+            <a:pPr marL="742950" lvl="1" indent="-285750">
+              <a:buFont typeface="Arial" panose="020B0604020202020204" pitchFamily="34" charset="0"/>
+              <a:buChar char="•"/>
+            </a:pPr>
+            <a:r>
+              <a:rPr lang="es-ES_tradnl" dirty="0"/>
+              <a:t>Gestionar su carrito de la compra (eliminar detalles, vaciar el carrito, confirmarlo, …).</a:t>
+            </a:r>
+          </a:p>
+          <a:p>
+            <a:pPr marL="285750" indent="-285750">
+              <a:buFont typeface="Arial" panose="020B0604020202020204" pitchFamily="34" charset="0"/>
+              <a:buChar char="•"/>
+            </a:pPr>
+            <a:r>
+              <a:rPr lang="es-ES_tradnl" b="1" dirty="0" smtClean="0"/>
+              <a:t>Administrador</a:t>
+            </a:r>
+          </a:p>
+          <a:p>
+            <a:pPr marL="742950" lvl="1" indent="-285750">
+              <a:buFont typeface="Arial" panose="020B0604020202020204" pitchFamily="34" charset="0"/>
+              <a:buChar char="•"/>
+            </a:pPr>
+            <a:r>
+              <a:rPr lang="es-ES_tradnl" u="sng" dirty="0"/>
+              <a:t>Acceso a las páginas más generales, como por ejemplo: Inicio, Productos, Quiénes somos, Contacto, …</a:t>
+            </a:r>
+          </a:p>
+          <a:p>
+            <a:pPr marL="742950" lvl="1" indent="-285750">
+              <a:buFont typeface="Arial" panose="020B0604020202020204" pitchFamily="34" charset="0"/>
+              <a:buChar char="•"/>
+            </a:pPr>
+            <a:r>
+              <a:rPr lang="es-ES_tradnl" dirty="0" smtClean="0"/>
+              <a:t>Modificar su contraseña.</a:t>
+            </a:r>
+          </a:p>
+          <a:p>
+            <a:pPr marL="742950" lvl="1" indent="-285750">
+              <a:buFont typeface="Arial" panose="020B0604020202020204" pitchFamily="34" charset="0"/>
+              <a:buChar char="•"/>
+            </a:pPr>
+            <a:r>
+              <a:rPr lang="es-ES_tradnl" dirty="0" smtClean="0"/>
+              <a:t>Gestionar </a:t>
+            </a:r>
+            <a:r>
+              <a:rPr lang="es-ES_tradnl" dirty="0"/>
+              <a:t>la información personal de los clientes.</a:t>
+            </a:r>
+          </a:p>
+          <a:p>
+            <a:pPr marL="742950" lvl="1" indent="-285750">
+              <a:buFont typeface="Arial" panose="020B0604020202020204" pitchFamily="34" charset="0"/>
+              <a:buChar char="•"/>
+            </a:pPr>
+            <a:r>
+              <a:rPr lang="es-ES_tradnl" dirty="0"/>
+              <a:t>Gestionar los productos, categorías, estados de los pedidos y los datos de los clientes.</a:t>
             </a:r>
           </a:p>
         </p:txBody>
@@ -4247,7 +4300,7 @@
     </p:spTree>
     <p:extLst>
       <p:ext uri="{BB962C8B-B14F-4D97-AF65-F5344CB8AC3E}">
-        <p14:creationId xmlns:p14="http://schemas.microsoft.com/office/powerpoint/2010/main" val="3146868311"/>
+        <p14:creationId xmlns:p14="http://schemas.microsoft.com/office/powerpoint/2010/main" val="2518971001"/>
       </p:ext>
     </p:extLst>
   </p:cSld>
@@ -4350,7 +4403,7 @@
                 <a14:useLocalDpi xmlns:a14="http://schemas.microsoft.com/office/drawing/2010/main" val="0"/>
               </a:ext>
               <a:ext uri="{96DAC541-7B7A-43D3-8B79-37D633B846F1}">
-                <asvg:svgBlip xmlns:asvg="http://schemas.microsoft.com/office/drawing/2016/SVG/main" xmlns="" r:embed="rId3"/>
+                <asvg:svgBlip xmlns="" xmlns:asvg="http://schemas.microsoft.com/office/drawing/2016/SVG/main" r:embed="rId3"/>
               </a:ext>
             </a:extLst>
           </a:blip>
@@ -4654,59 +4707,12 @@
           </a:p>
         </p:txBody>
       </p:sp>
-      <p:sp>
-        <p:nvSpPr>
-          <p:cNvPr id="2" name="Título 1">
-            <a:extLst>
-              <a:ext uri="{FF2B5EF4-FFF2-40B4-BE49-F238E27FC236}">
-                <a16:creationId xmlns:a16="http://schemas.microsoft.com/office/drawing/2014/main" id="{C30087AE-2DD3-48CD-A78C-BA5CDBD76431}"/>
-              </a:ext>
-            </a:extLst>
-          </p:cNvPr>
-          <p:cNvSpPr>
-            <a:spLocks noGrp="1"/>
-          </p:cNvSpPr>
-          <p:nvPr>
-            <p:ph type="title"/>
-          </p:nvPr>
-        </p:nvSpPr>
-        <p:spPr>
-          <a:xfrm>
-            <a:off x="257288" y="86061"/>
-            <a:ext cx="10515600" cy="960382"/>
-          </a:xfrm>
-        </p:spPr>
-        <p:txBody>
-          <a:bodyPr>
-            <a:normAutofit/>
-          </a:bodyPr>
-          <a:lstStyle/>
-          <a:p>
-            <a:r>
-              <a:rPr lang="es-ES" sz="3600" dirty="0">
-                <a:solidFill>
-                  <a:schemeClr val="bg1"/>
-                </a:solidFill>
-              </a:rPr>
-              <a:t>Modelo entidad / relación </a:t>
-            </a:r>
-            <a:r>
-              <a:rPr lang="es-ES" sz="3600" b="1" u="sng" dirty="0">
-                <a:solidFill>
-                  <a:schemeClr val="bg1"/>
-                </a:solidFill>
-              </a:rPr>
-              <a:t>de ASP.NET MVC</a:t>
-            </a:r>
-          </a:p>
-        </p:txBody>
-      </p:sp>
       <p:pic>
         <p:nvPicPr>
-          <p:cNvPr id="4" name="Imagen 3">
-            <a:extLst>
-              <a:ext uri="{FF2B5EF4-FFF2-40B4-BE49-F238E27FC236}">
-                <a16:creationId xmlns:a16="http://schemas.microsoft.com/office/drawing/2014/main" id="{ADFC3BBB-41F5-44BC-881B-83EC88D2D8B7}"/>
+          <p:cNvPr id="4" name="Gráfico 3">
+            <a:extLst>
+              <a:ext uri="{FF2B5EF4-FFF2-40B4-BE49-F238E27FC236}">
+                <a16:creationId xmlns:a16="http://schemas.microsoft.com/office/drawing/2014/main" id="{4EC377F4-23E6-4039-AAC3-B053F17FEB6A}"/>
               </a:ext>
             </a:extLst>
           </p:cNvPr>
@@ -4717,9 +4723,13 @@
         </p:nvPicPr>
         <p:blipFill>
           <a:blip r:embed="rId2">
+            <a:alphaModFix amt="10000"/>
             <a:extLst>
               <a:ext uri="{28A0092B-C50C-407E-A947-70E740481C1C}">
                 <a14:useLocalDpi xmlns:a14="http://schemas.microsoft.com/office/drawing/2010/main" val="0"/>
+              </a:ext>
+              <a:ext uri="{96DAC541-7B7A-43D3-8B79-37D633B846F1}">
+                <asvg:svgBlip xmlns="" xmlns:asvg="http://schemas.microsoft.com/office/drawing/2016/SVG/main" r:embed="rId3"/>
               </a:ext>
             </a:extLst>
           </a:blip>
@@ -4729,18 +4739,281 @@
         </p:blipFill>
         <p:spPr>
           <a:xfrm>
-            <a:off x="1776952" y="1854324"/>
-            <a:ext cx="8638095" cy="4323809"/>
+            <a:off x="-120473" y="2875877"/>
+            <a:ext cx="9780452" cy="4377607"/>
           </a:xfrm>
           <a:prstGeom prst="rect">
             <a:avLst/>
           </a:prstGeom>
         </p:spPr>
       </p:pic>
+      <p:sp>
+        <p:nvSpPr>
+          <p:cNvPr id="2" name="Título 1">
+            <a:extLst>
+              <a:ext uri="{FF2B5EF4-FFF2-40B4-BE49-F238E27FC236}">
+                <a16:creationId xmlns:a16="http://schemas.microsoft.com/office/drawing/2014/main" id="{C30087AE-2DD3-48CD-A78C-BA5CDBD76431}"/>
+              </a:ext>
+            </a:extLst>
+          </p:cNvPr>
+          <p:cNvSpPr>
+            <a:spLocks noGrp="1"/>
+          </p:cNvSpPr>
+          <p:nvPr>
+            <p:ph type="title"/>
+          </p:nvPr>
+        </p:nvSpPr>
+        <p:spPr>
+          <a:xfrm>
+            <a:off x="257288" y="86061"/>
+            <a:ext cx="10515600" cy="960382"/>
+          </a:xfrm>
+        </p:spPr>
+        <p:txBody>
+          <a:bodyPr>
+            <a:normAutofit/>
+          </a:bodyPr>
+          <a:lstStyle/>
+          <a:p>
+            <a:r>
+              <a:rPr lang="es-ES" sz="3600" dirty="0">
+                <a:solidFill>
+                  <a:schemeClr val="bg1"/>
+                </a:solidFill>
+              </a:rPr>
+              <a:t>Tecnologías utilizadas</a:t>
+            </a:r>
+          </a:p>
+        </p:txBody>
+      </p:sp>
+      <p:sp>
+        <p:nvSpPr>
+          <p:cNvPr id="3" name="CuadroTexto 2"/>
+          <p:cNvSpPr txBox="1"/>
+          <p:nvPr/>
+        </p:nvSpPr>
+        <p:spPr>
+          <a:xfrm>
+            <a:off x="597735" y="1306216"/>
+            <a:ext cx="11092441" cy="3139321"/>
+          </a:xfrm>
+          <a:prstGeom prst="rect">
+            <a:avLst/>
+          </a:prstGeom>
+          <a:noFill/>
+        </p:spPr>
+        <p:txBody>
+          <a:bodyPr wrap="square" rtlCol="0">
+            <a:spAutoFit/>
+          </a:bodyPr>
+          <a:lstStyle/>
+          <a:p>
+            <a:pPr marL="285750" indent="-285750">
+              <a:buFont typeface="Arial" panose="020B0604020202020204" pitchFamily="34" charset="0"/>
+              <a:buChar char="•"/>
+            </a:pPr>
+            <a:r>
+              <a:rPr lang="es-ES_tradnl" dirty="0"/>
+              <a:t>Aplicación web </a:t>
+            </a:r>
+            <a:r>
+              <a:rPr lang="es-ES_tradnl" b="1" dirty="0"/>
+              <a:t>ASP.NET</a:t>
+            </a:r>
+          </a:p>
+          <a:p>
+            <a:pPr marL="742950" lvl="1" indent="-285750">
+              <a:buFont typeface="Arial" panose="020B0604020202020204" pitchFamily="34" charset="0"/>
+              <a:buChar char="•"/>
+            </a:pPr>
+            <a:r>
+              <a:rPr lang="es-ES_tradnl" dirty="0"/>
+              <a:t>Técnica de </a:t>
+            </a:r>
+            <a:r>
+              <a:rPr lang="es-ES_tradnl" b="1" dirty="0" err="1"/>
+              <a:t>Database</a:t>
+            </a:r>
+            <a:r>
+              <a:rPr lang="es-ES_tradnl" b="1" dirty="0"/>
+              <a:t> </a:t>
+            </a:r>
+            <a:r>
+              <a:rPr lang="es-ES_tradnl" dirty="0" err="1"/>
+              <a:t>First</a:t>
+            </a:r>
+            <a:endParaRPr lang="es-ES_tradnl" dirty="0"/>
+          </a:p>
+          <a:p>
+            <a:pPr marL="1200150" lvl="2" indent="-285750">
+              <a:buFont typeface="Arial" panose="020B0604020202020204" pitchFamily="34" charset="0"/>
+              <a:buChar char="•"/>
+            </a:pPr>
+            <a:r>
+              <a:rPr lang="es-ES_tradnl" dirty="0"/>
+              <a:t>Se crea en primer lugar el modelo relacional.</a:t>
+            </a:r>
+            <a:endParaRPr lang="es-ES_tradnl" b="1" dirty="0"/>
+          </a:p>
+          <a:p>
+            <a:pPr marL="742950" lvl="1" indent="-285750">
+              <a:buFont typeface="Arial" panose="020B0604020202020204" pitchFamily="34" charset="0"/>
+              <a:buChar char="•"/>
+            </a:pPr>
+            <a:r>
+              <a:rPr lang="es-ES_tradnl" dirty="0"/>
+              <a:t>Se mapea la de base de datos con </a:t>
+            </a:r>
+            <a:r>
+              <a:rPr lang="es-ES_tradnl" b="1" dirty="0"/>
+              <a:t>ADO.NET </a:t>
+            </a:r>
+            <a:r>
+              <a:rPr lang="es-ES_tradnl" b="1" dirty="0" err="1"/>
+              <a:t>Entity</a:t>
+            </a:r>
+            <a:r>
+              <a:rPr lang="es-ES_tradnl" b="1" dirty="0"/>
+              <a:t> Data </a:t>
+            </a:r>
+            <a:r>
+              <a:rPr lang="es-ES_tradnl" b="1" dirty="0" err="1"/>
+              <a:t>Model</a:t>
+            </a:r>
+            <a:endParaRPr lang="es-ES_tradnl" b="1" dirty="0"/>
+          </a:p>
+          <a:p>
+            <a:pPr marL="1200150" lvl="2" indent="-285750">
+              <a:buFont typeface="Arial" panose="020B0604020202020204" pitchFamily="34" charset="0"/>
+              <a:buChar char="•"/>
+            </a:pPr>
+            <a:r>
+              <a:rPr lang="es-ES_tradnl" dirty="0"/>
+              <a:t>Se genera la entidad de modelo de datos de forma automatizada a partir de la base de datos del proyecto.</a:t>
+            </a:r>
+          </a:p>
+          <a:p>
+            <a:pPr marL="742950" lvl="1" indent="-285750">
+              <a:buFont typeface="Arial" panose="020B0604020202020204" pitchFamily="34" charset="0"/>
+              <a:buChar char="•"/>
+            </a:pPr>
+            <a:r>
+              <a:rPr lang="es-ES_tradnl" dirty="0"/>
+              <a:t>Acceso a los datos mediante </a:t>
+            </a:r>
+            <a:r>
+              <a:rPr lang="es-ES_tradnl" b="1" dirty="0"/>
+              <a:t>LINQ </a:t>
+            </a:r>
+            <a:r>
+              <a:rPr lang="es-ES_tradnl" dirty="0"/>
+              <a:t>(</a:t>
+            </a:r>
+            <a:r>
+              <a:rPr lang="es-ES_tradnl" dirty="0" err="1"/>
+              <a:t>Language</a:t>
+            </a:r>
+            <a:r>
+              <a:rPr lang="es-ES_tradnl" dirty="0"/>
+              <a:t> </a:t>
+            </a:r>
+            <a:r>
+              <a:rPr lang="es-ES_tradnl" dirty="0" err="1"/>
+              <a:t>Integrated</a:t>
+            </a:r>
+            <a:r>
+              <a:rPr lang="es-ES_tradnl" dirty="0"/>
+              <a:t> </a:t>
+            </a:r>
+            <a:r>
+              <a:rPr lang="es-ES_tradnl" dirty="0" err="1"/>
+              <a:t>Query</a:t>
+            </a:r>
+            <a:r>
+              <a:rPr lang="es-ES_tradnl" dirty="0"/>
+              <a:t>) </a:t>
+            </a:r>
+            <a:r>
+              <a:rPr lang="es-ES_tradnl" b="1" dirty="0" err="1"/>
+              <a:t>to</a:t>
+            </a:r>
+            <a:r>
+              <a:rPr lang="es-ES_tradnl" b="1" dirty="0"/>
+              <a:t> </a:t>
+            </a:r>
+            <a:r>
+              <a:rPr lang="es-ES_tradnl" b="1" dirty="0" err="1"/>
+              <a:t>Entities</a:t>
+            </a:r>
+            <a:r>
+              <a:rPr lang="es-ES_tradnl" b="1" dirty="0"/>
+              <a:t> </a:t>
+            </a:r>
+            <a:r>
+              <a:rPr lang="es-ES_tradnl" dirty="0"/>
+              <a:t>con consultas basadas en métodos con expresiones lambda.</a:t>
+            </a:r>
+          </a:p>
+          <a:p>
+            <a:pPr marL="742950" lvl="1" indent="-285750">
+              <a:buFont typeface="Arial" panose="020B0604020202020204" pitchFamily="34" charset="0"/>
+              <a:buChar char="•"/>
+            </a:pPr>
+            <a:r>
+              <a:rPr lang="es-ES_tradnl" dirty="0"/>
+              <a:t>Patrón </a:t>
+            </a:r>
+            <a:r>
+              <a:rPr lang="es-ES_tradnl" b="1" dirty="0"/>
+              <a:t>MVC</a:t>
+            </a:r>
+            <a:r>
+              <a:rPr lang="es-ES_tradnl" dirty="0"/>
+              <a:t> (Modelo - Vista - Controlador)</a:t>
+            </a:r>
+          </a:p>
+          <a:p>
+            <a:pPr marL="1200150" lvl="2" indent="-285750">
+              <a:buFont typeface="Arial" panose="020B0604020202020204" pitchFamily="34" charset="0"/>
+              <a:buChar char="•"/>
+            </a:pPr>
+            <a:r>
+              <a:rPr lang="es-ES_tradnl" u="sng" dirty="0"/>
+              <a:t>Vistas</a:t>
+            </a:r>
+          </a:p>
+          <a:p>
+            <a:pPr marL="1657350" lvl="3" indent="-285750">
+              <a:buFont typeface="Arial" panose="020B0604020202020204" pitchFamily="34" charset="0"/>
+              <a:buChar char="•"/>
+            </a:pPr>
+            <a:r>
+              <a:rPr lang="es-ES_tradnl" dirty="0"/>
+              <a:t>Uso del lenguaje o motor de vistas </a:t>
+            </a:r>
+            <a:r>
+              <a:rPr lang="es-ES_tradnl" b="1" dirty="0" err="1"/>
+              <a:t>Razor</a:t>
+            </a:r>
+            <a:r>
+              <a:rPr lang="es-ES_tradnl" dirty="0"/>
+              <a:t> (basado en </a:t>
+            </a:r>
+            <a:r>
+              <a:rPr lang="es-ES_tradnl" b="1" dirty="0"/>
+              <a:t>C#</a:t>
+            </a:r>
+            <a:r>
+              <a:rPr lang="es-ES_tradnl" dirty="0"/>
+              <a:t>).</a:t>
+            </a:r>
+          </a:p>
+        </p:txBody>
+      </p:sp>
     </p:spTree>
     <p:extLst>
       <p:ext uri="{BB962C8B-B14F-4D97-AF65-F5344CB8AC3E}">
-        <p14:creationId xmlns:p14="http://schemas.microsoft.com/office/powerpoint/2010/main" val="3846407689"/>
+        <p14:creationId xmlns:p14="http://schemas.microsoft.com/office/powerpoint/2010/main" val="3146868311"/>
       </p:ext>
     </p:extLst>
   </p:cSld>
@@ -4821,12 +5094,59 @@
           </a:p>
         </p:txBody>
       </p:sp>
+      <p:sp>
+        <p:nvSpPr>
+          <p:cNvPr id="2" name="Título 1">
+            <a:extLst>
+              <a:ext uri="{FF2B5EF4-FFF2-40B4-BE49-F238E27FC236}">
+                <a16:creationId xmlns:a16="http://schemas.microsoft.com/office/drawing/2014/main" id="{C30087AE-2DD3-48CD-A78C-BA5CDBD76431}"/>
+              </a:ext>
+            </a:extLst>
+          </p:cNvPr>
+          <p:cNvSpPr>
+            <a:spLocks noGrp="1"/>
+          </p:cNvSpPr>
+          <p:nvPr>
+            <p:ph type="title"/>
+          </p:nvPr>
+        </p:nvSpPr>
+        <p:spPr>
+          <a:xfrm>
+            <a:off x="257288" y="86061"/>
+            <a:ext cx="10515600" cy="960382"/>
+          </a:xfrm>
+        </p:spPr>
+        <p:txBody>
+          <a:bodyPr>
+            <a:normAutofit/>
+          </a:bodyPr>
+          <a:lstStyle/>
+          <a:p>
+            <a:r>
+              <a:rPr lang="es-ES" sz="3600" dirty="0">
+                <a:solidFill>
+                  <a:schemeClr val="bg1"/>
+                </a:solidFill>
+              </a:rPr>
+              <a:t>Modelo entidad / relación </a:t>
+            </a:r>
+            <a:r>
+              <a:rPr lang="es-ES" sz="3600" b="1" u="sng" dirty="0">
+                <a:solidFill>
+                  <a:schemeClr val="bg1"/>
+                </a:solidFill>
+              </a:rPr>
+              <a:t>de ASP.NET MVC</a:t>
+            </a:r>
+          </a:p>
+        </p:txBody>
+      </p:sp>
       <p:pic>
         <p:nvPicPr>
-          <p:cNvPr id="4" name="Gráfico 3">
-            <a:extLst>
-              <a:ext uri="{FF2B5EF4-FFF2-40B4-BE49-F238E27FC236}">
-                <a16:creationId xmlns:a16="http://schemas.microsoft.com/office/drawing/2014/main" id="{4EC377F4-23E6-4039-AAC3-B053F17FEB6A}"/>
+          <p:cNvPr id="4" name="Imagen 3">
+            <a:extLst>
+              <a:ext uri="{FF2B5EF4-FFF2-40B4-BE49-F238E27FC236}">
+                <a16:creationId xmlns:a16="http://schemas.microsoft.com/office/drawing/2014/main" id="{ADFC3BBB-41F5-44BC-881B-83EC88D2D8B7}"/>
               </a:ext>
             </a:extLst>
           </p:cNvPr>
@@ -4837,13 +5157,9 @@
         </p:nvPicPr>
         <p:blipFill>
           <a:blip r:embed="rId2">
-            <a:alphaModFix amt="10000"/>
             <a:extLst>
               <a:ext uri="{28A0092B-C50C-407E-A947-70E740481C1C}">
                 <a14:useLocalDpi xmlns:a14="http://schemas.microsoft.com/office/drawing/2010/main" val="0"/>
-              </a:ext>
-              <a:ext uri="{96DAC541-7B7A-43D3-8B79-37D633B846F1}">
-                <asvg:svgBlip xmlns:asvg="http://schemas.microsoft.com/office/drawing/2016/SVG/main" xmlns="" r:embed="rId3"/>
               </a:ext>
             </a:extLst>
           </a:blip>
@@ -4853,334 +5169,18 @@
         </p:blipFill>
         <p:spPr>
           <a:xfrm>
-            <a:off x="-120473" y="2875877"/>
-            <a:ext cx="9780452" cy="4377607"/>
+            <a:off x="1776952" y="1854324"/>
+            <a:ext cx="8638095" cy="4323809"/>
           </a:xfrm>
           <a:prstGeom prst="rect">
             <a:avLst/>
           </a:prstGeom>
         </p:spPr>
       </p:pic>
-      <p:sp>
-        <p:nvSpPr>
-          <p:cNvPr id="2" name="Título 1">
-            <a:extLst>
-              <a:ext uri="{FF2B5EF4-FFF2-40B4-BE49-F238E27FC236}">
-                <a16:creationId xmlns:a16="http://schemas.microsoft.com/office/drawing/2014/main" id="{C30087AE-2DD3-48CD-A78C-BA5CDBD76431}"/>
-              </a:ext>
-            </a:extLst>
-          </p:cNvPr>
-          <p:cNvSpPr>
-            <a:spLocks noGrp="1"/>
-          </p:cNvSpPr>
-          <p:nvPr>
-            <p:ph type="title"/>
-          </p:nvPr>
-        </p:nvSpPr>
-        <p:spPr>
-          <a:xfrm>
-            <a:off x="257288" y="86061"/>
-            <a:ext cx="11654850" cy="960382"/>
-          </a:xfrm>
-        </p:spPr>
-        <p:txBody>
-          <a:bodyPr>
-            <a:normAutofit/>
-          </a:bodyPr>
-          <a:lstStyle/>
-          <a:p>
-            <a:r>
-              <a:rPr lang="es-ES" sz="3600" dirty="0">
-                <a:solidFill>
-                  <a:schemeClr val="bg1"/>
-                </a:solidFill>
-              </a:rPr>
-              <a:t>Casos de uso </a:t>
-            </a:r>
-            <a:r>
-              <a:rPr lang="es-ES" sz="3600" b="1" dirty="0">
-                <a:solidFill>
-                  <a:schemeClr val="bg1"/>
-                </a:solidFill>
-              </a:rPr>
-              <a:t>más relevantes</a:t>
-            </a:r>
-            <a:r>
-              <a:rPr lang="es-ES" sz="3600" dirty="0">
-                <a:solidFill>
-                  <a:schemeClr val="bg1"/>
-                </a:solidFill>
-              </a:rPr>
-              <a:t> (</a:t>
-            </a:r>
-            <a:r>
-              <a:rPr lang="es-ES" sz="3600" u="sng" dirty="0">
-                <a:solidFill>
-                  <a:schemeClr val="bg1"/>
-                </a:solidFill>
-              </a:rPr>
-              <a:t>según la especificación previa</a:t>
-            </a:r>
-            <a:r>
-              <a:rPr lang="es-ES" sz="3600" dirty="0">
-                <a:solidFill>
-                  <a:schemeClr val="bg1"/>
-                </a:solidFill>
-              </a:rPr>
-              <a:t>)</a:t>
-            </a:r>
-            <a:endParaRPr lang="es-ES" sz="3600" b="1" dirty="0">
-              <a:solidFill>
-                <a:schemeClr val="bg1"/>
-              </a:solidFill>
-            </a:endParaRPr>
-          </a:p>
-        </p:txBody>
-      </p:sp>
-      <p:sp>
-        <p:nvSpPr>
-          <p:cNvPr id="3" name="CuadroTexto 2"/>
-          <p:cNvSpPr txBox="1"/>
-          <p:nvPr/>
-        </p:nvSpPr>
-        <p:spPr>
-          <a:xfrm>
-            <a:off x="358588" y="1155964"/>
-            <a:ext cx="11456894" cy="5632311"/>
-          </a:xfrm>
-          <a:prstGeom prst="rect">
-            <a:avLst/>
-          </a:prstGeom>
-          <a:noFill/>
-        </p:spPr>
-        <p:txBody>
-          <a:bodyPr wrap="square" rtlCol="0">
-            <a:spAutoFit/>
-          </a:bodyPr>
-          <a:lstStyle/>
-          <a:p>
-            <a:pPr marL="285750" indent="-285750">
-              <a:buFont typeface="Arial" panose="020B0604020202020204" pitchFamily="34" charset="0"/>
-              <a:buChar char="•"/>
-            </a:pPr>
-            <a:r>
-              <a:rPr lang="es-ES_tradnl" dirty="0"/>
-              <a:t>[Visitante]</a:t>
-            </a:r>
-          </a:p>
-          <a:p>
-            <a:pPr marL="742950" lvl="1" indent="-285750">
-              <a:buFont typeface="Arial" panose="020B0604020202020204" pitchFamily="34" charset="0"/>
-              <a:buChar char="•"/>
-            </a:pPr>
-            <a:r>
-              <a:rPr lang="es-ES_tradnl" u="sng" dirty="0"/>
-              <a:t>Acceso a las páginas más generales, como por ejemplo: Inicio, Productos, Quiénes somos, Contacto, …</a:t>
-            </a:r>
-            <a:endParaRPr lang="es-ES_tradnl" dirty="0"/>
-          </a:p>
-          <a:p>
-            <a:pPr marL="742950" lvl="1" indent="-285750">
-              <a:buFont typeface="Arial" panose="020B0604020202020204" pitchFamily="34" charset="0"/>
-              <a:buChar char="•"/>
-            </a:pPr>
-            <a:r>
-              <a:rPr lang="es-ES_tradnl" dirty="0"/>
-              <a:t>Crear una cuenta de usuario.</a:t>
-            </a:r>
-          </a:p>
-          <a:p>
-            <a:pPr marL="742950" lvl="1" indent="-285750">
-              <a:buFont typeface="Arial" panose="020B0604020202020204" pitchFamily="34" charset="0"/>
-              <a:buChar char="•"/>
-            </a:pPr>
-            <a:r>
-              <a:rPr lang="es-ES_tradnl" dirty="0"/>
-              <a:t>Iniciar sesión.</a:t>
-            </a:r>
-          </a:p>
-          <a:p>
-            <a:pPr marL="285750" indent="-285750">
-              <a:buFont typeface="Arial" panose="020B0604020202020204" pitchFamily="34" charset="0"/>
-              <a:buChar char="•"/>
-            </a:pPr>
-            <a:r>
-              <a:rPr lang="es-ES_tradnl" b="1" dirty="0"/>
-              <a:t>Usuario</a:t>
-            </a:r>
-          </a:p>
-          <a:p>
-            <a:pPr marL="742950" lvl="1" indent="-285750">
-              <a:buFont typeface="Arial" panose="020B0604020202020204" pitchFamily="34" charset="0"/>
-              <a:buChar char="•"/>
-            </a:pPr>
-            <a:r>
-              <a:rPr lang="es-ES_tradnl" u="sng" dirty="0"/>
-              <a:t>Acceso a las páginas más generales, como por ejemplo: Inicio, Productos, Quiénes somos, Contacto, …</a:t>
-            </a:r>
-          </a:p>
-          <a:p>
-            <a:pPr marL="742950" lvl="1" indent="-285750">
-              <a:buFont typeface="Arial" panose="020B0604020202020204" pitchFamily="34" charset="0"/>
-              <a:buChar char="•"/>
-            </a:pPr>
-            <a:r>
-              <a:rPr lang="es-ES_tradnl" dirty="0"/>
-              <a:t>Modificar su contraseña.</a:t>
-            </a:r>
-          </a:p>
-          <a:p>
-            <a:pPr marL="742950" lvl="1" indent="-285750">
-              <a:buFont typeface="Arial" panose="020B0604020202020204" pitchFamily="34" charset="0"/>
-              <a:buChar char="•"/>
-            </a:pPr>
-            <a:r>
-              <a:rPr lang="es-ES_tradnl" dirty="0"/>
-              <a:t>Introducir su información personal (se convertiría en cliente).</a:t>
-            </a:r>
-          </a:p>
-          <a:p>
-            <a:pPr marL="285750" indent="-285750">
-              <a:buFont typeface="Arial" panose="020B0604020202020204" pitchFamily="34" charset="0"/>
-              <a:buChar char="•"/>
-            </a:pPr>
-            <a:r>
-              <a:rPr lang="es-ES_tradnl" b="1" dirty="0"/>
-              <a:t>Cliente </a:t>
-            </a:r>
-            <a:r>
-              <a:rPr lang="es-ES_tradnl" dirty="0"/>
-              <a:t>(es un </a:t>
-            </a:r>
-            <a:r>
-              <a:rPr lang="es-ES_tradnl" u="sng" dirty="0"/>
-              <a:t>usuario</a:t>
-            </a:r>
-            <a:r>
-              <a:rPr lang="es-ES_tradnl" dirty="0"/>
-              <a:t> con su información personal)</a:t>
-            </a:r>
-          </a:p>
-          <a:p>
-            <a:pPr marL="742950" lvl="1" indent="-285750">
-              <a:buFont typeface="Arial" panose="020B0604020202020204" pitchFamily="34" charset="0"/>
-              <a:buChar char="•"/>
-            </a:pPr>
-            <a:r>
-              <a:rPr lang="es-ES_tradnl" u="sng" dirty="0"/>
-              <a:t>Acceso a las páginas más generales, como por ejemplo: Inicio, Productos, Quiénes somos, Contacto, …</a:t>
-            </a:r>
-          </a:p>
-          <a:p>
-            <a:pPr marL="742950" lvl="1" indent="-285750">
-              <a:buFont typeface="Arial" panose="020B0604020202020204" pitchFamily="34" charset="0"/>
-              <a:buChar char="•"/>
-            </a:pPr>
-            <a:r>
-              <a:rPr lang="es-ES_tradnl" dirty="0"/>
-              <a:t>Modificar su contraseña.</a:t>
-            </a:r>
-          </a:p>
-          <a:p>
-            <a:pPr marL="742950" lvl="1" indent="-285750">
-              <a:buFont typeface="Arial" panose="020B0604020202020204" pitchFamily="34" charset="0"/>
-              <a:buChar char="•"/>
-            </a:pPr>
-            <a:r>
-              <a:rPr lang="es-ES_tradnl" dirty="0"/>
-              <a:t>Actualizar su información personal.</a:t>
-            </a:r>
-          </a:p>
-          <a:p>
-            <a:pPr marL="742950" lvl="1" indent="-285750">
-              <a:buFont typeface="Arial" panose="020B0604020202020204" pitchFamily="34" charset="0"/>
-              <a:buChar char="•"/>
-            </a:pPr>
-            <a:r>
-              <a:rPr lang="es-ES_tradnl" dirty="0"/>
-              <a:t>Posibilidad de listar y ver sus pedidos ya confirmados (también puede filtrarlos por el estado).</a:t>
-            </a:r>
-          </a:p>
-          <a:p>
-            <a:pPr marL="742950" lvl="1" indent="-285750">
-              <a:buFont typeface="Arial" panose="020B0604020202020204" pitchFamily="34" charset="0"/>
-              <a:buChar char="•"/>
-            </a:pPr>
-            <a:r>
-              <a:rPr lang="es-ES_tradnl" dirty="0"/>
-              <a:t>Consultar el estado de sus pedidos ya confirmados.</a:t>
-            </a:r>
-          </a:p>
-          <a:p>
-            <a:pPr marL="742950" lvl="1" indent="-285750">
-              <a:buFont typeface="Arial" panose="020B0604020202020204" pitchFamily="34" charset="0"/>
-              <a:buChar char="•"/>
-            </a:pPr>
-            <a:r>
-              <a:rPr lang="es-ES_tradnl" dirty="0"/>
-              <a:t>Gestionar su carrito de la compra (eliminar detalles, vaciar el carrito, confirmarlo, …).</a:t>
-            </a:r>
-          </a:p>
-          <a:p>
-            <a:pPr marL="285750" indent="-285750">
-              <a:buFont typeface="Arial" panose="020B0604020202020204" pitchFamily="34" charset="0"/>
-              <a:buChar char="•"/>
-            </a:pPr>
-            <a:r>
-              <a:rPr lang="es-ES_tradnl" b="1" dirty="0" smtClean="0"/>
-              <a:t>Administrador</a:t>
-            </a:r>
-          </a:p>
-          <a:p>
-            <a:pPr marL="742950" lvl="1" indent="-285750">
-              <a:buFont typeface="Arial" panose="020B0604020202020204" pitchFamily="34" charset="0"/>
-              <a:buChar char="•"/>
-            </a:pPr>
-            <a:r>
-              <a:rPr lang="es-ES_tradnl" u="sng" dirty="0"/>
-              <a:t>Acceso a las páginas más generales, como por ejemplo: Inicio, Productos, Quiénes somos, Contacto, …</a:t>
-            </a:r>
-          </a:p>
-          <a:p>
-            <a:pPr marL="742950" lvl="1" indent="-285750">
-              <a:buFont typeface="Arial" panose="020B0604020202020204" pitchFamily="34" charset="0"/>
-              <a:buChar char="•"/>
-            </a:pPr>
-            <a:r>
-              <a:rPr lang="es-ES_tradnl" dirty="0" smtClean="0"/>
-              <a:t>Modificar su contraseña.</a:t>
-            </a:r>
-          </a:p>
-          <a:p>
-            <a:pPr marL="742950" lvl="1" indent="-285750">
-              <a:buFont typeface="Arial" panose="020B0604020202020204" pitchFamily="34" charset="0"/>
-              <a:buChar char="•"/>
-            </a:pPr>
-            <a:r>
-              <a:rPr lang="es-ES_tradnl" dirty="0" smtClean="0"/>
-              <a:t>Gestionar </a:t>
-            </a:r>
-            <a:r>
-              <a:rPr lang="es-ES_tradnl" dirty="0"/>
-              <a:t>la información personal de los clientes.</a:t>
-            </a:r>
-          </a:p>
-          <a:p>
-            <a:pPr marL="742950" lvl="1" indent="-285750">
-              <a:buFont typeface="Arial" panose="020B0604020202020204" pitchFamily="34" charset="0"/>
-              <a:buChar char="•"/>
-            </a:pPr>
-            <a:r>
-              <a:rPr lang="es-ES_tradnl" dirty="0"/>
-              <a:t>Gestionar los productos, categorías, estados de los pedidos y los datos de los clientes.</a:t>
-            </a:r>
-          </a:p>
-        </p:txBody>
-      </p:sp>
     </p:spTree>
     <p:extLst>
       <p:ext uri="{BB962C8B-B14F-4D97-AF65-F5344CB8AC3E}">
-        <p14:creationId xmlns:p14="http://schemas.microsoft.com/office/powerpoint/2010/main" val="2518971001"/>
+        <p14:creationId xmlns:p14="http://schemas.microsoft.com/office/powerpoint/2010/main" val="3846407689"/>
       </p:ext>
     </p:extLst>
   </p:cSld>
@@ -5396,7 +5396,7 @@
                 <a14:useLocalDpi xmlns:a14="http://schemas.microsoft.com/office/drawing/2010/main" val="0"/>
               </a:ext>
               <a:ext uri="{96DAC541-7B7A-43D3-8B79-37D633B846F1}">
-                <asvg:svgBlip xmlns:asvg="http://schemas.microsoft.com/office/drawing/2016/SVG/main" xmlns="" r:embed="rId3"/>
+                <asvg:svgBlip xmlns="" xmlns:asvg="http://schemas.microsoft.com/office/drawing/2016/SVG/main" r:embed="rId3"/>
               </a:ext>
             </a:extLst>
           </a:blip>
@@ -5464,7 +5464,7 @@
                 <a14:useLocalDpi xmlns:a14="http://schemas.microsoft.com/office/drawing/2010/main" val="0"/>
               </a:ext>
               <a:ext uri="{96DAC541-7B7A-43D3-8B79-37D633B846F1}">
-                <asvg:svgBlip xmlns:asvg="http://schemas.microsoft.com/office/drawing/2016/SVG/main" xmlns="" r:embed="rId5"/>
+                <asvg:svgBlip xmlns="" xmlns:asvg="http://schemas.microsoft.com/office/drawing/2016/SVG/main" r:embed="rId5"/>
               </a:ext>
             </a:extLst>
           </a:blip>

</xml_diff>